<commit_message>
Update face detection slides.
</commit_message>
<xml_diff>
--- a/FinalReport/Automatic Face Detection & Replacement Slideshow.pptx
+++ b/FinalReport/Automatic Face Detection & Replacement Slideshow.pptx
@@ -8,8 +8,16 @@
     <p:sldId id="256" r:id="rId2"/>
     <p:sldId id="257" r:id="rId3"/>
     <p:sldId id="258" r:id="rId4"/>
-    <p:sldId id="259" r:id="rId5"/>
-    <p:sldId id="260" r:id="rId6"/>
+    <p:sldId id="261" r:id="rId5"/>
+    <p:sldId id="259" r:id="rId6"/>
+    <p:sldId id="262" r:id="rId7"/>
+    <p:sldId id="263" r:id="rId8"/>
+    <p:sldId id="264" r:id="rId9"/>
+    <p:sldId id="266" r:id="rId10"/>
+    <p:sldId id="265" r:id="rId11"/>
+    <p:sldId id="267" r:id="rId12"/>
+    <p:sldId id="268" r:id="rId13"/>
+    <p:sldId id="269" r:id="rId14"/>
   </p:sldIdLst>
   <p:sldSz cx="9144000" cy="6858000" type="screen4x3"/>
   <p:notesSz cx="6858000" cy="9144000"/>
@@ -108,6 +116,22 @@
       </a:defRPr>
     </a:lvl9pPr>
   </p:defaultTextStyle>
+  <p:extLst>
+    <p:ext uri="{EFAFB233-063F-42B5-8137-9DF3F51BA10A}">
+      <p15:sldGuideLst xmlns:p15="http://schemas.microsoft.com/office/powerpoint/2012/main">
+        <p15:guide id="1" orient="horz" pos="2160">
+          <p15:clr>
+            <a:srgbClr val="A4A3A4"/>
+          </p15:clr>
+        </p15:guide>
+        <p15:guide id="2" pos="2880">
+          <p15:clr>
+            <a:srgbClr val="A4A3A4"/>
+          </p15:clr>
+        </p15:guide>
+      </p15:sldGuideLst>
+    </p:ext>
+  </p:extLst>
 </p:presentation>
 </file>
 
@@ -348,7 +372,7 @@
           <a:p>
             <a:fld id="{1E324CB4-F072-414C-8921-E4602240F5B0}" type="datetimeFigureOut">
               <a:rPr lang="en-US" smtClean="0"/>
-              <a:t>12/14/2014</a:t>
+              <a:t>12/17/2014</a:t>
             </a:fld>
             <a:endParaRPr lang="en-US"/>
           </a:p>
@@ -518,7 +542,7 @@
           <a:p>
             <a:fld id="{1E324CB4-F072-414C-8921-E4602240F5B0}" type="datetimeFigureOut">
               <a:rPr lang="en-US" smtClean="0"/>
-              <a:t>12/14/2014</a:t>
+              <a:t>12/17/2014</a:t>
             </a:fld>
             <a:endParaRPr lang="en-US"/>
           </a:p>
@@ -693,7 +717,7 @@
           <a:p>
             <a:fld id="{1E324CB4-F072-414C-8921-E4602240F5B0}" type="datetimeFigureOut">
               <a:rPr lang="en-US" smtClean="0"/>
-              <a:t>12/14/2014</a:t>
+              <a:t>12/17/2014</a:t>
             </a:fld>
             <a:endParaRPr lang="en-US"/>
           </a:p>
@@ -858,7 +882,7 @@
           <a:p>
             <a:fld id="{1E324CB4-F072-414C-8921-E4602240F5B0}" type="datetimeFigureOut">
               <a:rPr lang="en-US" smtClean="0"/>
-              <a:t>12/14/2014</a:t>
+              <a:t>12/17/2014</a:t>
             </a:fld>
             <a:endParaRPr lang="en-US"/>
           </a:p>
@@ -1115,7 +1139,7 @@
           <a:p>
             <a:fld id="{1E324CB4-F072-414C-8921-E4602240F5B0}" type="datetimeFigureOut">
               <a:rPr lang="en-US" smtClean="0"/>
-              <a:t>12/14/2014</a:t>
+              <a:t>12/17/2014</a:t>
             </a:fld>
             <a:endParaRPr lang="en-US"/>
           </a:p>
@@ -1255,7 +1279,7 @@
           <a:p>
             <a:fld id="{1E324CB4-F072-414C-8921-E4602240F5B0}" type="datetimeFigureOut">
               <a:rPr lang="en-US" smtClean="0"/>
-              <a:t>12/14/2014</a:t>
+              <a:t>12/17/2014</a:t>
             </a:fld>
             <a:endParaRPr lang="en-US"/>
           </a:p>
@@ -1905,7 +1929,7 @@
           <a:p>
             <a:fld id="{1E324CB4-F072-414C-8921-E4602240F5B0}" type="datetimeFigureOut">
               <a:rPr lang="en-US" smtClean="0"/>
-              <a:t>12/14/2014</a:t>
+              <a:t>12/17/2014</a:t>
             </a:fld>
             <a:endParaRPr lang="en-US"/>
           </a:p>
@@ -2018,7 +2042,7 @@
           <a:p>
             <a:fld id="{1E324CB4-F072-414C-8921-E4602240F5B0}" type="datetimeFigureOut">
               <a:rPr lang="en-US" smtClean="0"/>
-              <a:t>12/14/2014</a:t>
+              <a:t>12/17/2014</a:t>
             </a:fld>
             <a:endParaRPr lang="en-US"/>
           </a:p>
@@ -2108,7 +2132,7 @@
           <a:p>
             <a:fld id="{1E324CB4-F072-414C-8921-E4602240F5B0}" type="datetimeFigureOut">
               <a:rPr lang="en-US" smtClean="0"/>
-              <a:t>12/14/2014</a:t>
+              <a:t>12/17/2014</a:t>
             </a:fld>
             <a:endParaRPr lang="en-US"/>
           </a:p>
@@ -2398,7 +2422,7 @@
           <a:p>
             <a:fld id="{1E324CB4-F072-414C-8921-E4602240F5B0}" type="datetimeFigureOut">
               <a:rPr lang="en-US" smtClean="0"/>
-              <a:t>12/14/2014</a:t>
+              <a:t>12/17/2014</a:t>
             </a:fld>
             <a:endParaRPr lang="en-US"/>
           </a:p>
@@ -2721,7 +2745,7 @@
           <a:p>
             <a:fld id="{1E324CB4-F072-414C-8921-E4602240F5B0}" type="datetimeFigureOut">
               <a:rPr lang="en-US" smtClean="0"/>
-              <a:t>12/14/2014</a:t>
+              <a:t>12/17/2014</a:t>
             </a:fld>
             <a:endParaRPr lang="en-US"/>
           </a:p>
@@ -3178,7 +3202,7 @@
           <a:p>
             <a:fld id="{1E324CB4-F072-414C-8921-E4602240F5B0}" type="datetimeFigureOut">
               <a:rPr lang="en-US" smtClean="0"/>
-              <a:t>12/14/2014</a:t>
+              <a:t>12/17/2014</a:t>
             </a:fld>
             <a:endParaRPr lang="en-US"/>
           </a:p>
@@ -3768,6 +3792,358 @@
   <p:clrMapOvr>
     <a:masterClrMapping/>
   </p:clrMapOvr>
+  <p:timing>
+    <p:tnLst>
+      <p:par>
+        <p:cTn id="1" dur="indefinite" restart="never" nodeType="tmRoot"/>
+      </p:par>
+    </p:tnLst>
+  </p:timing>
+</p:sld>
+</file>
+
+<file path=ppt/slides/slide10.xml><?xml version="1.0" encoding="utf-8"?>
+<p:sld xmlns:a="http://schemas.openxmlformats.org/drawingml/2006/main" xmlns:r="http://schemas.openxmlformats.org/officeDocument/2006/relationships" xmlns:p="http://schemas.openxmlformats.org/presentationml/2006/main">
+  <p:cSld>
+    <p:spTree>
+      <p:nvGrpSpPr>
+        <p:cNvPr id="1" name=""/>
+        <p:cNvGrpSpPr/>
+        <p:nvPr/>
+      </p:nvGrpSpPr>
+      <p:grpSpPr>
+        <a:xfrm>
+          <a:off x="0" y="0"/>
+          <a:ext cx="0" cy="0"/>
+          <a:chOff x="0" y="0"/>
+          <a:chExt cx="0" cy="0"/>
+        </a:xfrm>
+      </p:grpSpPr>
+      <p:pic>
+        <p:nvPicPr>
+          <p:cNvPr id="2" name="Picture 1"/>
+          <p:cNvPicPr>
+            <a:picLocks noChangeAspect="1"/>
+          </p:cNvPicPr>
+          <p:nvPr/>
+        </p:nvPicPr>
+        <p:blipFill>
+          <a:blip r:embed="rId2">
+            <a:extLst>
+              <a:ext uri="{28A0092B-C50C-407E-A947-70E740481C1C}">
+                <a14:useLocalDpi xmlns:a14="http://schemas.microsoft.com/office/drawing/2010/main" val="0"/>
+              </a:ext>
+            </a:extLst>
+          </a:blip>
+          <a:stretch>
+            <a:fillRect/>
+          </a:stretch>
+        </p:blipFill>
+        <p:spPr>
+          <a:xfrm>
+            <a:off x="2362200" y="609600"/>
+            <a:ext cx="4267200" cy="5582168"/>
+          </a:xfrm>
+          <a:prstGeom prst="rect">
+            <a:avLst/>
+          </a:prstGeom>
+        </p:spPr>
+      </p:pic>
+    </p:spTree>
+    <p:extLst>
+      <p:ext uri="{BB962C8B-B14F-4D97-AF65-F5344CB8AC3E}">
+        <p14:creationId xmlns:p14="http://schemas.microsoft.com/office/powerpoint/2010/main" val="892009077"/>
+      </p:ext>
+    </p:extLst>
+  </p:cSld>
+  <p:clrMapOvr>
+    <a:masterClrMapping/>
+  </p:clrMapOvr>
+  <p:timing>
+    <p:tnLst>
+      <p:par>
+        <p:cTn id="1" dur="indefinite" restart="never" nodeType="tmRoot"/>
+      </p:par>
+    </p:tnLst>
+  </p:timing>
+</p:sld>
+</file>
+
+<file path=ppt/slides/slide11.xml><?xml version="1.0" encoding="utf-8"?>
+<p:sld xmlns:a="http://schemas.openxmlformats.org/drawingml/2006/main" xmlns:r="http://schemas.openxmlformats.org/officeDocument/2006/relationships" xmlns:p="http://schemas.openxmlformats.org/presentationml/2006/main">
+  <p:cSld>
+    <p:spTree>
+      <p:nvGrpSpPr>
+        <p:cNvPr id="1" name=""/>
+        <p:cNvGrpSpPr/>
+        <p:nvPr/>
+      </p:nvGrpSpPr>
+      <p:grpSpPr>
+        <a:xfrm>
+          <a:off x="0" y="0"/>
+          <a:ext cx="0" cy="0"/>
+          <a:chOff x="0" y="0"/>
+          <a:chExt cx="0" cy="0"/>
+        </a:xfrm>
+      </p:grpSpPr>
+      <p:sp>
+        <p:nvSpPr>
+          <p:cNvPr id="3" name="Title 2"/>
+          <p:cNvSpPr>
+            <a:spLocks noGrp="1"/>
+          </p:cNvSpPr>
+          <p:nvPr>
+            <p:ph type="title"/>
+          </p:nvPr>
+        </p:nvSpPr>
+        <p:spPr>
+          <a:xfrm>
+            <a:off x="762000" y="1066800"/>
+            <a:ext cx="7543800" cy="914400"/>
+          </a:xfrm>
+        </p:spPr>
+        <p:txBody>
+          <a:bodyPr/>
+          <a:lstStyle/>
+          <a:p>
+            <a:pPr algn="ctr"/>
+            <a:r>
+              <a:rPr lang="en-US" dirty="0" smtClean="0"/>
+              <a:t>Part I: Face Detection &amp; Replacement</a:t>
+            </a:r>
+            <a:endParaRPr lang="en-US" dirty="0"/>
+          </a:p>
+        </p:txBody>
+      </p:sp>
+      <p:sp>
+        <p:nvSpPr>
+          <p:cNvPr id="4" name="TextBox 3"/>
+          <p:cNvSpPr txBox="1"/>
+          <p:nvPr/>
+        </p:nvSpPr>
+        <p:spPr>
+          <a:xfrm>
+            <a:off x="762000" y="2709208"/>
+            <a:ext cx="7993380" cy="3416320"/>
+          </a:xfrm>
+          <a:prstGeom prst="rect">
+            <a:avLst/>
+          </a:prstGeom>
+          <a:noFill/>
+        </p:spPr>
+        <p:txBody>
+          <a:bodyPr wrap="square" rtlCol="0">
+            <a:spAutoFit/>
+          </a:bodyPr>
+          <a:lstStyle/>
+          <a:p>
+            <a:pPr marL="342900" indent="-342900">
+              <a:buFont typeface="Arial" panose="020B0604020202020204" pitchFamily="34" charset="0"/>
+              <a:buChar char="•"/>
+            </a:pPr>
+            <a:r>
+              <a:rPr lang="en-US" sz="2400" dirty="0" smtClean="0"/>
+              <a:t>Take center point of each detected feature (nose, mouth, right eye, left eye) as well as the two lower corners of the face’s bounding box as control points</a:t>
+            </a:r>
+            <a:endParaRPr lang="en-US" sz="2400" dirty="0" smtClean="0"/>
+          </a:p>
+          <a:p>
+            <a:pPr marL="342900" indent="-342900">
+              <a:buFont typeface="Arial" panose="020B0604020202020204" pitchFamily="34" charset="0"/>
+              <a:buChar char="•"/>
+            </a:pPr>
+            <a:endParaRPr lang="en-US" sz="2400" dirty="0" smtClean="0"/>
+          </a:p>
+          <a:p>
+            <a:pPr marL="342900" indent="-342900">
+              <a:buFont typeface="Arial" panose="020B0604020202020204" pitchFamily="34" charset="0"/>
+              <a:buChar char="•"/>
+            </a:pPr>
+            <a:r>
+              <a:rPr lang="en-US" sz="2400" dirty="0" smtClean="0"/>
+              <a:t>Use code from project 03 to create a projective warp </a:t>
+            </a:r>
+            <a:r>
+              <a:rPr lang="en-US" sz="2400" dirty="0" err="1" smtClean="0"/>
+              <a:t>homography</a:t>
+            </a:r>
+            <a:r>
+              <a:rPr lang="en-US" sz="2400" dirty="0" smtClean="0"/>
+              <a:t> from the corresponding control points</a:t>
+            </a:r>
+            <a:endParaRPr lang="en-US" sz="2400" dirty="0"/>
+          </a:p>
+          <a:p>
+            <a:pPr marL="342900" indent="-342900">
+              <a:buFont typeface="Arial" panose="020B0604020202020204" pitchFamily="34" charset="0"/>
+              <a:buChar char="•"/>
+            </a:pPr>
+            <a:endParaRPr lang="en-US" sz="2400" dirty="0" smtClean="0"/>
+          </a:p>
+          <a:p>
+            <a:pPr marL="342900" indent="-342900">
+              <a:buFont typeface="Arial" panose="020B0604020202020204" pitchFamily="34" charset="0"/>
+              <a:buChar char="•"/>
+            </a:pPr>
+            <a:r>
+              <a:rPr lang="en-US" sz="2400" dirty="0" smtClean="0"/>
+              <a:t>Project facial region of reference image onto target input image</a:t>
+            </a:r>
+            <a:endParaRPr lang="en-US" sz="2400" dirty="0" smtClean="0"/>
+          </a:p>
+        </p:txBody>
+      </p:sp>
+    </p:spTree>
+    <p:extLst>
+      <p:ext uri="{BB962C8B-B14F-4D97-AF65-F5344CB8AC3E}">
+        <p14:creationId xmlns:p14="http://schemas.microsoft.com/office/powerpoint/2010/main" val="1430709051"/>
+      </p:ext>
+    </p:extLst>
+  </p:cSld>
+  <p:clrMapOvr>
+    <a:masterClrMapping/>
+  </p:clrMapOvr>
+  <p:timing>
+    <p:tnLst>
+      <p:par>
+        <p:cTn id="1" dur="indefinite" restart="never" nodeType="tmRoot"/>
+      </p:par>
+    </p:tnLst>
+  </p:timing>
+</p:sld>
+</file>
+
+<file path=ppt/slides/slide12.xml><?xml version="1.0" encoding="utf-8"?>
+<p:sld xmlns:a="http://schemas.openxmlformats.org/drawingml/2006/main" xmlns:r="http://schemas.openxmlformats.org/officeDocument/2006/relationships" xmlns:p="http://schemas.openxmlformats.org/presentationml/2006/main">
+  <p:cSld>
+    <p:spTree>
+      <p:nvGrpSpPr>
+        <p:cNvPr id="1" name=""/>
+        <p:cNvGrpSpPr/>
+        <p:nvPr/>
+      </p:nvGrpSpPr>
+      <p:grpSpPr>
+        <a:xfrm>
+          <a:off x="0" y="0"/>
+          <a:ext cx="0" cy="0"/>
+          <a:chOff x="0" y="0"/>
+          <a:chExt cx="0" cy="0"/>
+        </a:xfrm>
+      </p:grpSpPr>
+      <p:pic>
+        <p:nvPicPr>
+          <p:cNvPr id="3" name="Picture 2"/>
+          <p:cNvPicPr>
+            <a:picLocks noChangeAspect="1"/>
+          </p:cNvPicPr>
+          <p:nvPr/>
+        </p:nvPicPr>
+        <p:blipFill>
+          <a:blip r:embed="rId2">
+            <a:extLst>
+              <a:ext uri="{28A0092B-C50C-407E-A947-70E740481C1C}">
+                <a14:useLocalDpi xmlns:a14="http://schemas.microsoft.com/office/drawing/2010/main" val="0"/>
+              </a:ext>
+            </a:extLst>
+          </a:blip>
+          <a:stretch>
+            <a:fillRect/>
+          </a:stretch>
+        </p:blipFill>
+        <p:spPr>
+          <a:xfrm>
+            <a:off x="2362200" y="609600"/>
+            <a:ext cx="4267200" cy="5582168"/>
+          </a:xfrm>
+          <a:prstGeom prst="rect">
+            <a:avLst/>
+          </a:prstGeom>
+        </p:spPr>
+      </p:pic>
+    </p:spTree>
+    <p:extLst>
+      <p:ext uri="{BB962C8B-B14F-4D97-AF65-F5344CB8AC3E}">
+        <p14:creationId xmlns:p14="http://schemas.microsoft.com/office/powerpoint/2010/main" val="1062182808"/>
+      </p:ext>
+    </p:extLst>
+  </p:cSld>
+  <p:clrMapOvr>
+    <a:masterClrMapping/>
+  </p:clrMapOvr>
+  <p:timing>
+    <p:tnLst>
+      <p:par>
+        <p:cTn id="1" dur="indefinite" restart="never" nodeType="tmRoot"/>
+      </p:par>
+    </p:tnLst>
+  </p:timing>
+</p:sld>
+</file>
+
+<file path=ppt/slides/slide13.xml><?xml version="1.0" encoding="utf-8"?>
+<p:sld xmlns:a="http://schemas.openxmlformats.org/drawingml/2006/main" xmlns:r="http://schemas.openxmlformats.org/officeDocument/2006/relationships" xmlns:p="http://schemas.openxmlformats.org/presentationml/2006/main">
+  <p:cSld>
+    <p:spTree>
+      <p:nvGrpSpPr>
+        <p:cNvPr id="1" name=""/>
+        <p:cNvGrpSpPr/>
+        <p:nvPr/>
+      </p:nvGrpSpPr>
+      <p:grpSpPr>
+        <a:xfrm>
+          <a:off x="0" y="0"/>
+          <a:ext cx="0" cy="0"/>
+          <a:chOff x="0" y="0"/>
+          <a:chExt cx="0" cy="0"/>
+        </a:xfrm>
+      </p:grpSpPr>
+      <p:pic>
+        <p:nvPicPr>
+          <p:cNvPr id="2" name="Picture 1"/>
+          <p:cNvPicPr>
+            <a:picLocks noChangeAspect="1"/>
+          </p:cNvPicPr>
+          <p:nvPr/>
+        </p:nvPicPr>
+        <p:blipFill>
+          <a:blip r:embed="rId2">
+            <a:extLst>
+              <a:ext uri="{28A0092B-C50C-407E-A947-70E740481C1C}">
+                <a14:useLocalDpi xmlns:a14="http://schemas.microsoft.com/office/drawing/2010/main" val="0"/>
+              </a:ext>
+            </a:extLst>
+          </a:blip>
+          <a:stretch>
+            <a:fillRect/>
+          </a:stretch>
+        </p:blipFill>
+        <p:spPr>
+          <a:xfrm>
+            <a:off x="2362200" y="609600"/>
+            <a:ext cx="4267200" cy="5582168"/>
+          </a:xfrm>
+          <a:prstGeom prst="rect">
+            <a:avLst/>
+          </a:prstGeom>
+        </p:spPr>
+      </p:pic>
+    </p:spTree>
+    <p:extLst>
+      <p:ext uri="{BB962C8B-B14F-4D97-AF65-F5344CB8AC3E}">
+        <p14:creationId xmlns:p14="http://schemas.microsoft.com/office/powerpoint/2010/main" val="1977379917"/>
+      </p:ext>
+    </p:extLst>
+  </p:cSld>
+  <p:clrMapOvr>
+    <a:masterClrMapping/>
+  </p:clrMapOvr>
+  <p:timing>
+    <p:tnLst>
+      <p:par>
+        <p:cTn id="1" dur="indefinite" restart="never" nodeType="tmRoot"/>
+      </p:par>
+    </p:tnLst>
+  </p:timing>
 </p:sld>
 </file>
 
@@ -3917,6 +4293,13 @@
   <p:clrMapOvr>
     <a:masterClrMapping/>
   </p:clrMapOvr>
+  <p:timing>
+    <p:tnLst>
+      <p:par>
+        <p:cTn id="1" dur="indefinite" restart="never" nodeType="tmRoot"/>
+      </p:par>
+    </p:tnLst>
+  </p:timing>
 </p:sld>
 </file>
 
@@ -3949,7 +4332,7 @@
         </p:nvSpPr>
         <p:spPr>
           <a:xfrm>
-            <a:off x="762000" y="457200"/>
+            <a:off x="762000" y="1066800"/>
             <a:ext cx="7543800" cy="914400"/>
           </a:xfrm>
         </p:spPr>
@@ -3960,7 +4343,7 @@
             <a:pPr algn="ctr"/>
             <a:r>
               <a:rPr lang="en-US" dirty="0" smtClean="0"/>
-              <a:t>Overview of Algorithm</a:t>
+              <a:t>Part I: Face Detection &amp; Replacement</a:t>
             </a:r>
             <a:endParaRPr lang="en-US" dirty="0"/>
           </a:p>
@@ -3974,8 +4357,8 @@
         </p:nvSpPr>
         <p:spPr>
           <a:xfrm>
-            <a:off x="4183380" y="2286000"/>
-            <a:ext cx="4572000" cy="2677656"/>
+            <a:off x="762000" y="2709208"/>
+            <a:ext cx="7993380" cy="2677656"/>
           </a:xfrm>
           <a:prstGeom prst="rect">
             <a:avLst/>
@@ -3988,23 +4371,15 @@
           </a:bodyPr>
           <a:lstStyle/>
           <a:p>
-            <a:r>
-              <a:rPr lang="en-US" sz="2400" dirty="0" smtClean="0"/>
-              <a:t>Program can be divided into two main parts</a:t>
-            </a:r>
-          </a:p>
-          <a:p>
-            <a:endParaRPr lang="en-US" sz="2400" dirty="0" smtClean="0"/>
-          </a:p>
-          <a:p>
             <a:pPr marL="342900" indent="-342900">
               <a:buFont typeface="Arial" panose="020B0604020202020204" pitchFamily="34" charset="0"/>
               <a:buChar char="•"/>
             </a:pPr>
             <a:r>
               <a:rPr lang="en-US" sz="2400" dirty="0" smtClean="0"/>
-              <a:t>Part I: Face Detection and Replacement</a:t>
-            </a:r>
+              <a:t>Program uses third-party feature detection code</a:t>
+            </a:r>
+            <a:endParaRPr lang="en-US" sz="2400" dirty="0" smtClean="0"/>
           </a:p>
           <a:p>
             <a:pPr marL="342900" indent="-342900">
@@ -4020,42 +4395,34 @@
             </a:pPr>
             <a:r>
               <a:rPr lang="en-US" sz="2400" dirty="0" smtClean="0"/>
-              <a:t>Part II: Poisson Blending</a:t>
+              <a:t>Specifically, we utilize MATLAB’s feature detector class, </a:t>
+            </a:r>
+            <a:r>
+              <a:rPr lang="en-US" sz="2400" dirty="0" err="1" smtClean="0"/>
+              <a:t>CascadeObjectDetector</a:t>
             </a:r>
             <a:endParaRPr lang="en-US" sz="2400" dirty="0"/>
           </a:p>
-        </p:txBody>
-      </p:sp>
-      <p:pic>
-        <p:nvPicPr>
-          <p:cNvPr id="5" name="Picture 4"/>
-          <p:cNvPicPr>
-            <a:picLocks noChangeAspect="1"/>
-          </p:cNvPicPr>
-          <p:nvPr/>
-        </p:nvPicPr>
-        <p:blipFill>
-          <a:blip r:embed="rId2">
-            <a:extLst>
-              <a:ext uri="{28A0092B-C50C-407E-A947-70E740481C1C}">
-                <a14:useLocalDpi xmlns:a14="http://schemas.microsoft.com/office/drawing/2010/main" val="0"/>
-              </a:ext>
-            </a:extLst>
-          </a:blip>
-          <a:stretch>
-            <a:fillRect/>
-          </a:stretch>
-        </p:blipFill>
-        <p:spPr>
-          <a:xfrm>
-            <a:off x="914400" y="1677371"/>
-            <a:ext cx="2895600" cy="4681221"/>
-          </a:xfrm>
-          <a:prstGeom prst="rect">
-            <a:avLst/>
-          </a:prstGeom>
-        </p:spPr>
-      </p:pic>
+          <a:p>
+            <a:pPr marL="342900" indent="-342900">
+              <a:buFont typeface="Arial" panose="020B0604020202020204" pitchFamily="34" charset="0"/>
+              <a:buChar char="•"/>
+            </a:pPr>
+            <a:endParaRPr lang="en-US" sz="2400" dirty="0" smtClean="0"/>
+          </a:p>
+          <a:p>
+            <a:pPr marL="342900" indent="-342900">
+              <a:buFont typeface="Arial" panose="020B0604020202020204" pitchFamily="34" charset="0"/>
+              <a:buChar char="•"/>
+            </a:pPr>
+            <a:r>
+              <a:rPr lang="en-US" sz="2400" dirty="0" smtClean="0"/>
+              <a:t>Detector includes pre-trained classifications for face, nose, mouth, and individual eyes (among other things)</a:t>
+            </a:r>
+            <a:endParaRPr lang="en-US" sz="2400" dirty="0"/>
+          </a:p>
+        </p:txBody>
+      </p:sp>
     </p:spTree>
     <p:extLst>
       <p:ext uri="{BB962C8B-B14F-4D97-AF65-F5344CB8AC3E}">
@@ -4066,6 +4433,13 @@
   <p:clrMapOvr>
     <a:masterClrMapping/>
   </p:clrMapOvr>
+  <p:timing>
+    <p:tnLst>
+      <p:par>
+        <p:cTn id="1" dur="indefinite" restart="never" nodeType="tmRoot"/>
+      </p:par>
+    </p:tnLst>
+  </p:timing>
 </p:sld>
 </file>
 
@@ -4098,7 +4472,7 @@
         </p:nvSpPr>
         <p:spPr>
           <a:xfrm>
-            <a:off x="762000" y="457200"/>
+            <a:off x="762000" y="1066800"/>
             <a:ext cx="7543800" cy="914400"/>
           </a:xfrm>
         </p:spPr>
@@ -4109,7 +4483,7 @@
             <a:pPr algn="ctr"/>
             <a:r>
               <a:rPr lang="en-US" dirty="0" smtClean="0"/>
-              <a:t>Overview of Algorithm</a:t>
+              <a:t>Part I: Face Detection &amp; Replacement</a:t>
             </a:r>
             <a:endParaRPr lang="en-US" dirty="0"/>
           </a:p>
@@ -4123,8 +4497,8 @@
         </p:nvSpPr>
         <p:spPr>
           <a:xfrm>
-            <a:off x="4183380" y="2286000"/>
-            <a:ext cx="4572000" cy="2677656"/>
+            <a:off x="762000" y="2709208"/>
+            <a:ext cx="7993380" cy="3785652"/>
           </a:xfrm>
           <a:prstGeom prst="rect">
             <a:avLst/>
@@ -4137,23 +4511,23 @@
           </a:bodyPr>
           <a:lstStyle/>
           <a:p>
-            <a:r>
-              <a:rPr lang="en-US" sz="2400" dirty="0" smtClean="0"/>
-              <a:t>Program can be divided into two main parts</a:t>
-            </a:r>
-          </a:p>
-          <a:p>
-            <a:endParaRPr lang="en-US" sz="2400" dirty="0" smtClean="0"/>
-          </a:p>
-          <a:p>
             <a:pPr marL="342900" indent="-342900">
               <a:buFont typeface="Arial" panose="020B0604020202020204" pitchFamily="34" charset="0"/>
               <a:buChar char="•"/>
             </a:pPr>
             <a:r>
               <a:rPr lang="en-US" sz="2400" dirty="0" smtClean="0"/>
-              <a:t>Part I: Face Detection and Replacement</a:t>
-            </a:r>
+              <a:t>Unfortunately</a:t>
+            </a:r>
+            <a:r>
+              <a:rPr lang="en-US" sz="2400" smtClean="0"/>
+              <a:t>, ran </a:t>
+            </a:r>
+            <a:r>
+              <a:rPr lang="en-US" sz="2400" dirty="0" smtClean="0"/>
+              <a:t>into a lot of false positives</a:t>
+            </a:r>
+            <a:endParaRPr lang="en-US" sz="2400" dirty="0" smtClean="0"/>
           </a:p>
           <a:p>
             <a:pPr marL="342900" indent="-342900">
@@ -4169,52 +4543,96 @@
             </a:pPr>
             <a:r>
               <a:rPr lang="en-US" sz="2400" dirty="0" smtClean="0"/>
-              <a:t>Part II: Poisson Blending</a:t>
-            </a:r>
+              <a:t>Make assumptions about placement of features within face and provide checks</a:t>
+            </a:r>
+          </a:p>
+          <a:p>
+            <a:pPr marL="342900" indent="-342900">
+              <a:buFont typeface="Arial" panose="020B0604020202020204" pitchFamily="34" charset="0"/>
+              <a:buChar char="•"/>
+            </a:pPr>
+            <a:endParaRPr lang="en-US" sz="2400" dirty="0" smtClean="0"/>
+          </a:p>
+          <a:p>
+            <a:pPr marL="800100" lvl="1" indent="-342900">
+              <a:buFont typeface="Arial" panose="020B0604020202020204" pitchFamily="34" charset="0"/>
+              <a:buChar char="•"/>
+            </a:pPr>
+            <a:r>
+              <a:rPr lang="en-US" sz="2400" dirty="0" smtClean="0"/>
+              <a:t>Assume correct </a:t>
+            </a:r>
+            <a:r>
+              <a:rPr lang="en-US" sz="2400" dirty="0" err="1" smtClean="0"/>
+              <a:t>LeftEye</a:t>
+            </a:r>
+            <a:r>
+              <a:rPr lang="en-US" sz="2400" dirty="0" smtClean="0"/>
+              <a:t> is left-most feature</a:t>
+            </a:r>
+          </a:p>
+          <a:p>
+            <a:pPr marL="800100" lvl="1" indent="-342900">
+              <a:buFont typeface="Arial" panose="020B0604020202020204" pitchFamily="34" charset="0"/>
+              <a:buChar char="•"/>
+            </a:pPr>
+            <a:endParaRPr lang="en-US" sz="2400" dirty="0" smtClean="0"/>
+          </a:p>
+          <a:p>
+            <a:pPr marL="800100" lvl="1" indent="-342900">
+              <a:buFont typeface="Arial" panose="020B0604020202020204" pitchFamily="34" charset="0"/>
+              <a:buChar char="•"/>
+            </a:pPr>
+            <a:r>
+              <a:rPr lang="en-US" sz="2400" dirty="0" smtClean="0"/>
+              <a:t>Assume correct </a:t>
+            </a:r>
+            <a:r>
+              <a:rPr lang="en-US" sz="2400" dirty="0" err="1" smtClean="0"/>
+              <a:t>RightEye</a:t>
+            </a:r>
+            <a:r>
+              <a:rPr lang="en-US" sz="2400" dirty="0" smtClean="0"/>
+              <a:t> is right-most feature</a:t>
+            </a:r>
+          </a:p>
+          <a:p>
+            <a:pPr marL="800100" lvl="1" indent="-342900">
+              <a:buFont typeface="Arial" panose="020B0604020202020204" pitchFamily="34" charset="0"/>
+              <a:buChar char="•"/>
+            </a:pPr>
             <a:endParaRPr lang="en-US" sz="2400" dirty="0"/>
           </a:p>
-        </p:txBody>
-      </p:sp>
-      <p:pic>
-        <p:nvPicPr>
-          <p:cNvPr id="5" name="Picture 4"/>
-          <p:cNvPicPr>
-            <a:picLocks noChangeAspect="1"/>
-          </p:cNvPicPr>
-          <p:nvPr/>
-        </p:nvPicPr>
-        <p:blipFill>
-          <a:blip r:embed="rId2">
-            <a:extLst>
-              <a:ext uri="{28A0092B-C50C-407E-A947-70E740481C1C}">
-                <a14:useLocalDpi xmlns:a14="http://schemas.microsoft.com/office/drawing/2010/main" val="0"/>
-              </a:ext>
-            </a:extLst>
-          </a:blip>
-          <a:stretch>
-            <a:fillRect/>
-          </a:stretch>
-        </p:blipFill>
-        <p:spPr>
-          <a:xfrm>
-            <a:off x="914400" y="1677371"/>
-            <a:ext cx="2895600" cy="4681221"/>
-          </a:xfrm>
-          <a:prstGeom prst="rect">
-            <a:avLst/>
-          </a:prstGeom>
-        </p:spPr>
-      </p:pic>
+          <a:p>
+            <a:pPr marL="800100" lvl="1" indent="-342900">
+              <a:buFont typeface="Arial" panose="020B0604020202020204" pitchFamily="34" charset="0"/>
+              <a:buChar char="•"/>
+            </a:pPr>
+            <a:r>
+              <a:rPr lang="en-US" sz="2400" dirty="0" smtClean="0"/>
+              <a:t>Assume correct Mouth is lowest feature</a:t>
+            </a:r>
+            <a:endParaRPr lang="en-US" sz="2400" dirty="0"/>
+          </a:p>
+        </p:txBody>
+      </p:sp>
     </p:spTree>
     <p:extLst>
       <p:ext uri="{BB962C8B-B14F-4D97-AF65-F5344CB8AC3E}">
-        <p14:creationId xmlns:p14="http://schemas.microsoft.com/office/powerpoint/2010/main" val="947617796"/>
+        <p14:creationId xmlns:p14="http://schemas.microsoft.com/office/powerpoint/2010/main" val="2462662634"/>
       </p:ext>
     </p:extLst>
   </p:cSld>
   <p:clrMapOvr>
     <a:masterClrMapping/>
   </p:clrMapOvr>
+  <p:timing>
+    <p:tnLst>
+      <p:par>
+        <p:cTn id="1" dur="indefinite" restart="never" nodeType="tmRoot"/>
+      </p:par>
+    </p:tnLst>
+  </p:timing>
 </p:sld>
 </file>
 
@@ -4235,117 +4653,210 @@
           <a:chExt cx="0" cy="0"/>
         </a:xfrm>
       </p:grpSpPr>
-      <p:sp>
-        <p:nvSpPr>
-          <p:cNvPr id="3" name="Title 2"/>
-          <p:cNvSpPr>
-            <a:spLocks noGrp="1"/>
-          </p:cNvSpPr>
-          <p:nvPr>
-            <p:ph type="title"/>
-          </p:nvPr>
-        </p:nvSpPr>
+      <p:pic>
+        <p:nvPicPr>
+          <p:cNvPr id="2" name="Picture 1"/>
+          <p:cNvPicPr>
+            <a:picLocks noChangeAspect="1"/>
+          </p:cNvPicPr>
+          <p:nvPr/>
+        </p:nvPicPr>
+        <p:blipFill>
+          <a:blip r:embed="rId2" cstate="print">
+            <a:extLst>
+              <a:ext uri="{28A0092B-C50C-407E-A947-70E740481C1C}">
+                <a14:useLocalDpi xmlns:a14="http://schemas.microsoft.com/office/drawing/2010/main" val="0"/>
+              </a:ext>
+            </a:extLst>
+          </a:blip>
+          <a:stretch>
+            <a:fillRect/>
+          </a:stretch>
+        </p:blipFill>
         <p:spPr>
           <a:xfrm>
-            <a:off x="762000" y="457200"/>
-            <a:ext cx="7543800" cy="914400"/>
-          </a:xfrm>
-        </p:spPr>
-        <p:txBody>
-          <a:bodyPr/>
-          <a:lstStyle/>
-          <a:p>
-            <a:pPr algn="ctr"/>
-            <a:r>
-              <a:rPr lang="en-US" dirty="0" smtClean="0"/>
-              <a:t>Part 1</a:t>
-            </a:r>
-            <a:r>
-              <a:rPr lang="en-US" smtClean="0"/>
-              <a:t>: </a:t>
-            </a:r>
-            <a:br>
-              <a:rPr lang="en-US" smtClean="0"/>
-            </a:br>
-            <a:r>
-              <a:rPr lang="en-US" smtClean="0"/>
-              <a:t>Face </a:t>
-            </a:r>
-            <a:r>
-              <a:rPr lang="en-US" dirty="0" smtClean="0"/>
-              <a:t>Detection </a:t>
-            </a:r>
-            <a:r>
-              <a:rPr lang="en-US" smtClean="0"/>
-              <a:t>&amp; Replacement</a:t>
-            </a:r>
-            <a:endParaRPr lang="en-US" dirty="0"/>
-          </a:p>
-        </p:txBody>
-      </p:sp>
-      <p:sp>
-        <p:nvSpPr>
-          <p:cNvPr id="4" name="TextBox 3"/>
-          <p:cNvSpPr txBox="1"/>
-          <p:nvPr/>
-        </p:nvSpPr>
-        <p:spPr>
-          <a:xfrm>
-            <a:off x="4183380" y="2286000"/>
-            <a:ext cx="4572000" cy="2677656"/>
+            <a:off x="2643187" y="0"/>
+            <a:ext cx="3857625" cy="6858000"/>
           </a:xfrm>
           <a:prstGeom prst="rect">
             <a:avLst/>
           </a:prstGeom>
-          <a:noFill/>
         </p:spPr>
-        <p:txBody>
-          <a:bodyPr wrap="square" rtlCol="0">
-            <a:spAutoFit/>
-          </a:bodyPr>
-          <a:lstStyle/>
-          <a:p>
-            <a:r>
-              <a:rPr lang="en-US" sz="2400" dirty="0" smtClean="0"/>
-              <a:t>Program can be divided into two main parts</a:t>
-            </a:r>
-          </a:p>
-          <a:p>
-            <a:endParaRPr lang="en-US" sz="2400" dirty="0" smtClean="0"/>
-          </a:p>
-          <a:p>
-            <a:pPr marL="342900" indent="-342900">
-              <a:buFont typeface="Arial" panose="020B0604020202020204" pitchFamily="34" charset="0"/>
-              <a:buChar char="•"/>
-            </a:pPr>
-            <a:r>
-              <a:rPr lang="en-US" sz="2400" dirty="0" smtClean="0"/>
-              <a:t>Part I: Face Detection and Replacement</a:t>
-            </a:r>
-          </a:p>
-          <a:p>
-            <a:pPr marL="342900" indent="-342900">
-              <a:buFont typeface="Arial" panose="020B0604020202020204" pitchFamily="34" charset="0"/>
-              <a:buChar char="•"/>
-            </a:pPr>
-            <a:endParaRPr lang="en-US" sz="2400" dirty="0" smtClean="0"/>
-          </a:p>
-          <a:p>
-            <a:pPr marL="342900" indent="-342900">
-              <a:buFont typeface="Arial" panose="020B0604020202020204" pitchFamily="34" charset="0"/>
-              <a:buChar char="•"/>
-            </a:pPr>
-            <a:r>
-              <a:rPr lang="en-US" sz="2400" dirty="0" smtClean="0"/>
-              <a:t>Part II: Poisson Blending</a:t>
-            </a:r>
-            <a:endParaRPr lang="en-US" sz="2400" dirty="0"/>
-          </a:p>
-        </p:txBody>
-      </p:sp>
+      </p:pic>
+    </p:spTree>
+    <p:extLst>
+      <p:ext uri="{BB962C8B-B14F-4D97-AF65-F5344CB8AC3E}">
+        <p14:creationId xmlns:p14="http://schemas.microsoft.com/office/powerpoint/2010/main" val="947617796"/>
+      </p:ext>
+    </p:extLst>
+  </p:cSld>
+  <p:clrMapOvr>
+    <a:masterClrMapping/>
+  </p:clrMapOvr>
+  <p:timing>
+    <p:tnLst>
+      <p:par>
+        <p:cTn id="1" dur="indefinite" restart="never" nodeType="tmRoot"/>
+      </p:par>
+    </p:tnLst>
+  </p:timing>
+</p:sld>
+</file>
+
+<file path=ppt/slides/slide6.xml><?xml version="1.0" encoding="utf-8"?>
+<p:sld xmlns:a="http://schemas.openxmlformats.org/drawingml/2006/main" xmlns:r="http://schemas.openxmlformats.org/officeDocument/2006/relationships" xmlns:p="http://schemas.openxmlformats.org/presentationml/2006/main">
+  <p:cSld>
+    <p:spTree>
+      <p:nvGrpSpPr>
+        <p:cNvPr id="1" name=""/>
+        <p:cNvGrpSpPr/>
+        <p:nvPr/>
+      </p:nvGrpSpPr>
+      <p:grpSpPr>
+        <a:xfrm>
+          <a:off x="0" y="0"/>
+          <a:ext cx="0" cy="0"/>
+          <a:chOff x="0" y="0"/>
+          <a:chExt cx="0" cy="0"/>
+        </a:xfrm>
+      </p:grpSpPr>
       <p:pic>
         <p:nvPicPr>
-          <p:cNvPr id="5" name="Picture 4"/>
+          <p:cNvPr id="4" name="Picture 3"/>
+          <p:cNvPicPr>
+            <a:picLocks noChangeAspect="1"/>
+          </p:cNvPicPr>
+          <p:nvPr/>
+        </p:nvPicPr>
+        <p:blipFill>
+          <a:blip r:embed="rId2" cstate="print">
+            <a:extLst>
+              <a:ext uri="{28A0092B-C50C-407E-A947-70E740481C1C}">
+                <a14:useLocalDpi xmlns:a14="http://schemas.microsoft.com/office/drawing/2010/main" val="0"/>
+              </a:ext>
+            </a:extLst>
+          </a:blip>
+          <a:stretch>
+            <a:fillRect/>
+          </a:stretch>
+        </p:blipFill>
+        <p:spPr>
+          <a:xfrm>
+            <a:off x="2643187" y="0"/>
+            <a:ext cx="3857625" cy="6858000"/>
+          </a:xfrm>
+          <a:prstGeom prst="rect">
+            <a:avLst/>
+          </a:prstGeom>
+        </p:spPr>
+      </p:pic>
+    </p:spTree>
+    <p:extLst>
+      <p:ext uri="{BB962C8B-B14F-4D97-AF65-F5344CB8AC3E}">
+        <p14:creationId xmlns:p14="http://schemas.microsoft.com/office/powerpoint/2010/main" val="1215205020"/>
+      </p:ext>
+    </p:extLst>
+  </p:cSld>
+  <p:clrMapOvr>
+    <a:masterClrMapping/>
+  </p:clrMapOvr>
+  <p:timing>
+    <p:tnLst>
+      <p:par>
+        <p:cTn id="1" dur="indefinite" restart="never" nodeType="tmRoot"/>
+      </p:par>
+    </p:tnLst>
+  </p:timing>
+</p:sld>
+</file>
+
+<file path=ppt/slides/slide7.xml><?xml version="1.0" encoding="utf-8"?>
+<p:sld xmlns:a="http://schemas.openxmlformats.org/drawingml/2006/main" xmlns:r="http://schemas.openxmlformats.org/officeDocument/2006/relationships" xmlns:p="http://schemas.openxmlformats.org/presentationml/2006/main">
+  <p:cSld>
+    <p:spTree>
+      <p:nvGrpSpPr>
+        <p:cNvPr id="1" name=""/>
+        <p:cNvGrpSpPr/>
+        <p:nvPr/>
+      </p:nvGrpSpPr>
+      <p:grpSpPr>
+        <a:xfrm>
+          <a:off x="0" y="0"/>
+          <a:ext cx="0" cy="0"/>
+          <a:chOff x="0" y="0"/>
+          <a:chExt cx="0" cy="0"/>
+        </a:xfrm>
+      </p:grpSpPr>
+      <p:pic>
+        <p:nvPicPr>
+          <p:cNvPr id="2" name="Picture 1"/>
+          <p:cNvPicPr>
+            <a:picLocks noChangeAspect="1"/>
+          </p:cNvPicPr>
+          <p:nvPr/>
+        </p:nvPicPr>
+        <p:blipFill>
+          <a:blip r:embed="rId2" cstate="print">
+            <a:extLst>
+              <a:ext uri="{28A0092B-C50C-407E-A947-70E740481C1C}">
+                <a14:useLocalDpi xmlns:a14="http://schemas.microsoft.com/office/drawing/2010/main" val="0"/>
+              </a:ext>
+            </a:extLst>
+          </a:blip>
+          <a:stretch>
+            <a:fillRect/>
+          </a:stretch>
+        </p:blipFill>
+        <p:spPr>
+          <a:xfrm>
+            <a:off x="2643187" y="0"/>
+            <a:ext cx="3857625" cy="6858000"/>
+          </a:xfrm>
+          <a:prstGeom prst="rect">
+            <a:avLst/>
+          </a:prstGeom>
+        </p:spPr>
+      </p:pic>
+    </p:spTree>
+    <p:extLst>
+      <p:ext uri="{BB962C8B-B14F-4D97-AF65-F5344CB8AC3E}">
+        <p14:creationId xmlns:p14="http://schemas.microsoft.com/office/powerpoint/2010/main" val="4216468800"/>
+      </p:ext>
+    </p:extLst>
+  </p:cSld>
+  <p:clrMapOvr>
+    <a:masterClrMapping/>
+  </p:clrMapOvr>
+  <p:timing>
+    <p:tnLst>
+      <p:par>
+        <p:cTn id="1" dur="indefinite" restart="never" nodeType="tmRoot"/>
+      </p:par>
+    </p:tnLst>
+  </p:timing>
+</p:sld>
+</file>
+
+<file path=ppt/slides/slide8.xml><?xml version="1.0" encoding="utf-8"?>
+<p:sld xmlns:a="http://schemas.openxmlformats.org/drawingml/2006/main" xmlns:r="http://schemas.openxmlformats.org/officeDocument/2006/relationships" xmlns:p="http://schemas.openxmlformats.org/presentationml/2006/main">
+  <p:cSld>
+    <p:spTree>
+      <p:nvGrpSpPr>
+        <p:cNvPr id="1" name=""/>
+        <p:cNvGrpSpPr/>
+        <p:nvPr/>
+      </p:nvGrpSpPr>
+      <p:grpSpPr>
+        <a:xfrm>
+          <a:off x="0" y="0"/>
+          <a:ext cx="0" cy="0"/>
+          <a:chOff x="0" y="0"/>
+          <a:chExt cx="0" cy="0"/>
+        </a:xfrm>
+      </p:grpSpPr>
+      <p:pic>
+        <p:nvPicPr>
+          <p:cNvPr id="3" name="Picture 2"/>
           <p:cNvPicPr>
             <a:picLocks noChangeAspect="1"/>
           </p:cNvPicPr>
@@ -4365,8 +4876,8 @@
         </p:blipFill>
         <p:spPr>
           <a:xfrm>
-            <a:off x="914400" y="1677371"/>
-            <a:ext cx="2895600" cy="4681221"/>
+            <a:off x="2362200" y="609600"/>
+            <a:ext cx="4267200" cy="5582168"/>
           </a:xfrm>
           <a:prstGeom prst="rect">
             <a:avLst/>
@@ -4376,13 +4887,87 @@
     </p:spTree>
     <p:extLst>
       <p:ext uri="{BB962C8B-B14F-4D97-AF65-F5344CB8AC3E}">
-        <p14:creationId xmlns:p14="http://schemas.microsoft.com/office/powerpoint/2010/main" val="947617796"/>
+        <p14:creationId xmlns:p14="http://schemas.microsoft.com/office/powerpoint/2010/main" val="81962265"/>
       </p:ext>
     </p:extLst>
   </p:cSld>
   <p:clrMapOvr>
     <a:masterClrMapping/>
   </p:clrMapOvr>
+  <p:timing>
+    <p:tnLst>
+      <p:par>
+        <p:cTn id="1" dur="indefinite" restart="never" nodeType="tmRoot"/>
+      </p:par>
+    </p:tnLst>
+  </p:timing>
+</p:sld>
+</file>
+
+<file path=ppt/slides/slide9.xml><?xml version="1.0" encoding="utf-8"?>
+<p:sld xmlns:a="http://schemas.openxmlformats.org/drawingml/2006/main" xmlns:r="http://schemas.openxmlformats.org/officeDocument/2006/relationships" xmlns:p="http://schemas.openxmlformats.org/presentationml/2006/main">
+  <p:cSld>
+    <p:spTree>
+      <p:nvGrpSpPr>
+        <p:cNvPr id="1" name=""/>
+        <p:cNvGrpSpPr/>
+        <p:nvPr/>
+      </p:nvGrpSpPr>
+      <p:grpSpPr>
+        <a:xfrm>
+          <a:off x="0" y="0"/>
+          <a:ext cx="0" cy="0"/>
+          <a:chOff x="0" y="0"/>
+          <a:chExt cx="0" cy="0"/>
+        </a:xfrm>
+      </p:grpSpPr>
+      <p:pic>
+        <p:nvPicPr>
+          <p:cNvPr id="2" name="Picture 1"/>
+          <p:cNvPicPr>
+            <a:picLocks noChangeAspect="1"/>
+          </p:cNvPicPr>
+          <p:nvPr/>
+        </p:nvPicPr>
+        <p:blipFill>
+          <a:blip r:embed="rId2">
+            <a:extLst>
+              <a:ext uri="{28A0092B-C50C-407E-A947-70E740481C1C}">
+                <a14:useLocalDpi xmlns:a14="http://schemas.microsoft.com/office/drawing/2010/main" val="0"/>
+              </a:ext>
+            </a:extLst>
+          </a:blip>
+          <a:stretch>
+            <a:fillRect/>
+          </a:stretch>
+        </p:blipFill>
+        <p:spPr>
+          <a:xfrm>
+            <a:off x="2362200" y="609599"/>
+            <a:ext cx="4268638" cy="5584049"/>
+          </a:xfrm>
+          <a:prstGeom prst="rect">
+            <a:avLst/>
+          </a:prstGeom>
+        </p:spPr>
+      </p:pic>
+    </p:spTree>
+    <p:extLst>
+      <p:ext uri="{BB962C8B-B14F-4D97-AF65-F5344CB8AC3E}">
+        <p14:creationId xmlns:p14="http://schemas.microsoft.com/office/powerpoint/2010/main" val="352180411"/>
+      </p:ext>
+    </p:extLst>
+  </p:cSld>
+  <p:clrMapOvr>
+    <a:masterClrMapping/>
+  </p:clrMapOvr>
+  <p:timing>
+    <p:tnLst>
+      <p:par>
+        <p:cTn id="1" dur="indefinite" restart="never" nodeType="tmRoot"/>
+      </p:par>
+    </p:tnLst>
+  </p:timing>
 </p:sld>
 </file>
 

</xml_diff>

<commit_message>
Modify blending algorithm to accept parameters to set stopping criteria.
</commit_message>
<xml_diff>
--- a/FinalReport/Automatic Face Detection & Replacement Slideshow.pptx
+++ b/FinalReport/Automatic Face Detection & Replacement Slideshow.pptx
@@ -17,7 +17,19 @@
     <p:sldId id="265" r:id="rId11"/>
     <p:sldId id="267" r:id="rId12"/>
     <p:sldId id="268" r:id="rId13"/>
-    <p:sldId id="269" r:id="rId14"/>
+    <p:sldId id="271" r:id="rId14"/>
+    <p:sldId id="280" r:id="rId15"/>
+    <p:sldId id="281" r:id="rId16"/>
+    <p:sldId id="269" r:id="rId17"/>
+    <p:sldId id="270" r:id="rId18"/>
+    <p:sldId id="272" r:id="rId19"/>
+    <p:sldId id="273" r:id="rId20"/>
+    <p:sldId id="274" r:id="rId21"/>
+    <p:sldId id="275" r:id="rId22"/>
+    <p:sldId id="276" r:id="rId23"/>
+    <p:sldId id="277" r:id="rId24"/>
+    <p:sldId id="278" r:id="rId25"/>
+    <p:sldId id="279" r:id="rId26"/>
   </p:sldIdLst>
   <p:sldSz cx="9144000" cy="6858000" type="screen4x3"/>
   <p:notesSz cx="6858000" cy="9144000"/>
@@ -3945,7 +3957,6 @@
               <a:rPr lang="en-US" sz="2400" dirty="0" smtClean="0"/>
               <a:t>Take center point of each detected feature (nose, mouth, right eye, left eye) as well as the two lower corners of the face’s bounding box as control points</a:t>
             </a:r>
-            <a:endParaRPr lang="en-US" sz="2400" dirty="0" smtClean="0"/>
           </a:p>
           <a:p>
             <a:pPr marL="342900" indent="-342900">
@@ -3989,7 +4000,6 @@
               <a:rPr lang="en-US" sz="2400" dirty="0" smtClean="0"/>
               <a:t>Project facial region of reference image onto target input image</a:t>
             </a:r>
-            <a:endParaRPr lang="en-US" sz="2400" dirty="0" smtClean="0"/>
           </a:p>
         </p:txBody>
       </p:sp>
@@ -4097,6 +4107,65 @@
           <a:chExt cx="0" cy="0"/>
         </a:xfrm>
       </p:grpSpPr>
+      <p:sp>
+        <p:nvSpPr>
+          <p:cNvPr id="3" name="Title 2"/>
+          <p:cNvSpPr>
+            <a:spLocks noGrp="1"/>
+          </p:cNvSpPr>
+          <p:nvPr>
+            <p:ph type="title"/>
+          </p:nvPr>
+        </p:nvSpPr>
+        <p:spPr>
+          <a:xfrm>
+            <a:off x="762000" y="457200"/>
+            <a:ext cx="7543800" cy="914400"/>
+          </a:xfrm>
+        </p:spPr>
+        <p:txBody>
+          <a:bodyPr/>
+          <a:lstStyle/>
+          <a:p>
+            <a:pPr algn="ctr"/>
+            <a:r>
+              <a:rPr lang="en-US" dirty="0" smtClean="0"/>
+              <a:t>Alpha mask</a:t>
+            </a:r>
+            <a:endParaRPr lang="en-US" dirty="0"/>
+          </a:p>
+        </p:txBody>
+      </p:sp>
+      <p:sp>
+        <p:nvSpPr>
+          <p:cNvPr id="4" name="TextBox 3"/>
+          <p:cNvSpPr txBox="1"/>
+          <p:nvPr/>
+        </p:nvSpPr>
+        <p:spPr>
+          <a:xfrm>
+            <a:off x="2819400" y="3542182"/>
+            <a:ext cx="457200" cy="461665"/>
+          </a:xfrm>
+          <a:prstGeom prst="rect">
+            <a:avLst/>
+          </a:prstGeom>
+          <a:noFill/>
+        </p:spPr>
+        <p:txBody>
+          <a:bodyPr wrap="square" rtlCol="0">
+            <a:spAutoFit/>
+          </a:bodyPr>
+          <a:lstStyle/>
+          <a:p>
+            <a:r>
+              <a:rPr lang="en-US" sz="2400" dirty="0" smtClean="0"/>
+              <a:t>+</a:t>
+            </a:r>
+            <a:endParaRPr lang="en-US" sz="2400" dirty="0" smtClean="0"/>
+          </a:p>
+        </p:txBody>
+      </p:sp>
       <p:pic>
         <p:nvPicPr>
           <p:cNvPr id="2" name="Picture 1"/>
@@ -4119,6 +4188,360 @@
         </p:blipFill>
         <p:spPr>
           <a:xfrm>
+            <a:off x="270827" y="2284383"/>
+            <a:ext cx="2300268" cy="3009111"/>
+          </a:xfrm>
+          <a:prstGeom prst="rect">
+            <a:avLst/>
+          </a:prstGeom>
+        </p:spPr>
+      </p:pic>
+      <p:pic>
+        <p:nvPicPr>
+          <p:cNvPr id="6" name="Picture 5"/>
+          <p:cNvPicPr>
+            <a:picLocks noChangeAspect="1"/>
+          </p:cNvPicPr>
+          <p:nvPr/>
+        </p:nvPicPr>
+        <p:blipFill>
+          <a:blip r:embed="rId3">
+            <a:extLst>
+              <a:ext uri="{28A0092B-C50C-407E-A947-70E740481C1C}">
+                <a14:useLocalDpi xmlns:a14="http://schemas.microsoft.com/office/drawing/2010/main" val="0"/>
+              </a:ext>
+            </a:extLst>
+          </a:blip>
+          <a:stretch>
+            <a:fillRect/>
+          </a:stretch>
+        </p:blipFill>
+        <p:spPr>
+          <a:xfrm>
+            <a:off x="6553200" y="2284383"/>
+            <a:ext cx="2288095" cy="2993188"/>
+          </a:xfrm>
+          <a:prstGeom prst="rect">
+            <a:avLst/>
+          </a:prstGeom>
+        </p:spPr>
+      </p:pic>
+      <p:pic>
+        <p:nvPicPr>
+          <p:cNvPr id="7" name="Picture 6"/>
+          <p:cNvPicPr>
+            <a:picLocks noChangeAspect="1"/>
+          </p:cNvPicPr>
+          <p:nvPr/>
+        </p:nvPicPr>
+        <p:blipFill>
+          <a:blip r:embed="rId4">
+            <a:extLst>
+              <a:ext uri="{28A0092B-C50C-407E-A947-70E740481C1C}">
+                <a14:useLocalDpi xmlns:a14="http://schemas.microsoft.com/office/drawing/2010/main" val="0"/>
+              </a:ext>
+            </a:extLst>
+          </a:blip>
+          <a:stretch>
+            <a:fillRect/>
+          </a:stretch>
+        </p:blipFill>
+        <p:spPr>
+          <a:xfrm>
+            <a:off x="3429000" y="2268459"/>
+            <a:ext cx="2300268" cy="3009112"/>
+          </a:xfrm>
+          <a:prstGeom prst="rect">
+            <a:avLst/>
+          </a:prstGeom>
+        </p:spPr>
+      </p:pic>
+      <p:sp>
+        <p:nvSpPr>
+          <p:cNvPr id="8" name="TextBox 7"/>
+          <p:cNvSpPr txBox="1"/>
+          <p:nvPr/>
+        </p:nvSpPr>
+        <p:spPr>
+          <a:xfrm>
+            <a:off x="5943600" y="3542181"/>
+            <a:ext cx="457200" cy="461665"/>
+          </a:xfrm>
+          <a:prstGeom prst="rect">
+            <a:avLst/>
+          </a:prstGeom>
+          <a:noFill/>
+        </p:spPr>
+        <p:txBody>
+          <a:bodyPr wrap="square" rtlCol="0">
+            <a:spAutoFit/>
+          </a:bodyPr>
+          <a:lstStyle/>
+          <a:p>
+            <a:r>
+              <a:rPr lang="en-US" sz="2400" dirty="0"/>
+              <a:t>=</a:t>
+            </a:r>
+            <a:endParaRPr lang="en-US" sz="2400" dirty="0" smtClean="0"/>
+          </a:p>
+        </p:txBody>
+      </p:sp>
+    </p:spTree>
+    <p:extLst>
+      <p:ext uri="{BB962C8B-B14F-4D97-AF65-F5344CB8AC3E}">
+        <p14:creationId xmlns:p14="http://schemas.microsoft.com/office/powerpoint/2010/main" val="738651451"/>
+      </p:ext>
+    </p:extLst>
+  </p:cSld>
+  <p:clrMapOvr>
+    <a:masterClrMapping/>
+  </p:clrMapOvr>
+  <p:timing>
+    <p:tnLst>
+      <p:par>
+        <p:cTn id="1" dur="indefinite" restart="never" nodeType="tmRoot"/>
+      </p:par>
+    </p:tnLst>
+  </p:timing>
+</p:sld>
+</file>
+
+<file path=ppt/slides/slide14.xml><?xml version="1.0" encoding="utf-8"?>
+<p:sld xmlns:a="http://schemas.openxmlformats.org/drawingml/2006/main" xmlns:r="http://schemas.openxmlformats.org/officeDocument/2006/relationships" xmlns:p="http://schemas.openxmlformats.org/presentationml/2006/main">
+  <p:cSld>
+    <p:spTree>
+      <p:nvGrpSpPr>
+        <p:cNvPr id="1" name=""/>
+        <p:cNvGrpSpPr/>
+        <p:nvPr/>
+      </p:nvGrpSpPr>
+      <p:grpSpPr>
+        <a:xfrm>
+          <a:off x="0" y="0"/>
+          <a:ext cx="0" cy="0"/>
+          <a:chOff x="0" y="0"/>
+          <a:chExt cx="0" cy="0"/>
+        </a:xfrm>
+      </p:grpSpPr>
+      <p:pic>
+        <p:nvPicPr>
+          <p:cNvPr id="5" name="Picture 4"/>
+          <p:cNvPicPr>
+            <a:picLocks noChangeAspect="1"/>
+          </p:cNvPicPr>
+          <p:nvPr/>
+        </p:nvPicPr>
+        <p:blipFill>
+          <a:blip r:embed="rId2">
+            <a:extLst>
+              <a:ext uri="{28A0092B-C50C-407E-A947-70E740481C1C}">
+                <a14:useLocalDpi xmlns:a14="http://schemas.microsoft.com/office/drawing/2010/main" val="0"/>
+              </a:ext>
+            </a:extLst>
+          </a:blip>
+          <a:stretch>
+            <a:fillRect/>
+          </a:stretch>
+        </p:blipFill>
+        <p:spPr>
+          <a:xfrm>
+            <a:off x="818626" y="675402"/>
+            <a:ext cx="7506748" cy="6258798"/>
+          </a:xfrm>
+          <a:prstGeom prst="rect">
+            <a:avLst/>
+          </a:prstGeom>
+        </p:spPr>
+      </p:pic>
+    </p:spTree>
+    <p:extLst>
+      <p:ext uri="{BB962C8B-B14F-4D97-AF65-F5344CB8AC3E}">
+        <p14:creationId xmlns:p14="http://schemas.microsoft.com/office/powerpoint/2010/main" val="381195424"/>
+      </p:ext>
+    </p:extLst>
+  </p:cSld>
+  <p:clrMapOvr>
+    <a:masterClrMapping/>
+  </p:clrMapOvr>
+  <p:timing>
+    <p:tnLst>
+      <p:par>
+        <p:cTn id="1" dur="indefinite" restart="never" nodeType="tmRoot"/>
+      </p:par>
+    </p:tnLst>
+  </p:timing>
+</p:sld>
+</file>
+
+<file path=ppt/slides/slide15.xml><?xml version="1.0" encoding="utf-8"?>
+<p:sld xmlns:a="http://schemas.openxmlformats.org/drawingml/2006/main" xmlns:r="http://schemas.openxmlformats.org/officeDocument/2006/relationships" xmlns:p="http://schemas.openxmlformats.org/presentationml/2006/main">
+  <p:cSld>
+    <p:spTree>
+      <p:nvGrpSpPr>
+        <p:cNvPr id="1" name=""/>
+        <p:cNvGrpSpPr/>
+        <p:nvPr/>
+      </p:nvGrpSpPr>
+      <p:grpSpPr>
+        <a:xfrm>
+          <a:off x="0" y="0"/>
+          <a:ext cx="0" cy="0"/>
+          <a:chOff x="0" y="0"/>
+          <a:chExt cx="0" cy="0"/>
+        </a:xfrm>
+      </p:grpSpPr>
+      <p:sp>
+        <p:nvSpPr>
+          <p:cNvPr id="3" name="Title 2"/>
+          <p:cNvSpPr>
+            <a:spLocks noGrp="1"/>
+          </p:cNvSpPr>
+          <p:nvPr>
+            <p:ph type="title"/>
+          </p:nvPr>
+        </p:nvSpPr>
+        <p:spPr>
+          <a:xfrm>
+            <a:off x="762000" y="457200"/>
+            <a:ext cx="7543800" cy="914400"/>
+          </a:xfrm>
+        </p:spPr>
+        <p:txBody>
+          <a:bodyPr/>
+          <a:lstStyle/>
+          <a:p>
+            <a:pPr algn="ctr"/>
+            <a:r>
+              <a:rPr lang="en-US" dirty="0" smtClean="0"/>
+              <a:t>Poisson blendin</a:t>
+            </a:r>
+            <a:r>
+              <a:rPr lang="en-US" dirty="0" smtClean="0"/>
+              <a:t>g</a:t>
+            </a:r>
+            <a:endParaRPr lang="en-US" dirty="0"/>
+          </a:p>
+        </p:txBody>
+      </p:sp>
+      <p:pic>
+        <p:nvPicPr>
+          <p:cNvPr id="2" name="Picture 1"/>
+          <p:cNvPicPr>
+            <a:picLocks noChangeAspect="1"/>
+          </p:cNvPicPr>
+          <p:nvPr/>
+        </p:nvPicPr>
+        <p:blipFill>
+          <a:blip r:embed="rId2">
+            <a:extLst>
+              <a:ext uri="{28A0092B-C50C-407E-A947-70E740481C1C}">
+                <a14:useLocalDpi xmlns:a14="http://schemas.microsoft.com/office/drawing/2010/main" val="0"/>
+              </a:ext>
+            </a:extLst>
+          </a:blip>
+          <a:stretch>
+            <a:fillRect/>
+          </a:stretch>
+        </p:blipFill>
+        <p:spPr>
+          <a:xfrm>
+            <a:off x="1895106" y="1504596"/>
+            <a:ext cx="5277587" cy="2372056"/>
+          </a:xfrm>
+          <a:prstGeom prst="rect">
+            <a:avLst/>
+          </a:prstGeom>
+        </p:spPr>
+      </p:pic>
+      <p:pic>
+        <p:nvPicPr>
+          <p:cNvPr id="5" name="Picture 4"/>
+          <p:cNvPicPr>
+            <a:picLocks noChangeAspect="1"/>
+          </p:cNvPicPr>
+          <p:nvPr/>
+        </p:nvPicPr>
+        <p:blipFill>
+          <a:blip r:embed="rId3">
+            <a:extLst>
+              <a:ext uri="{28A0092B-C50C-407E-A947-70E740481C1C}">
+                <a14:useLocalDpi xmlns:a14="http://schemas.microsoft.com/office/drawing/2010/main" val="0"/>
+              </a:ext>
+            </a:extLst>
+          </a:blip>
+          <a:stretch>
+            <a:fillRect/>
+          </a:stretch>
+        </p:blipFill>
+        <p:spPr>
+          <a:xfrm>
+            <a:off x="1895106" y="4011923"/>
+            <a:ext cx="5277587" cy="2667066"/>
+          </a:xfrm>
+          <a:prstGeom prst="rect">
+            <a:avLst/>
+          </a:prstGeom>
+        </p:spPr>
+      </p:pic>
+    </p:spTree>
+    <p:extLst>
+      <p:ext uri="{BB962C8B-B14F-4D97-AF65-F5344CB8AC3E}">
+        <p14:creationId xmlns:p14="http://schemas.microsoft.com/office/powerpoint/2010/main" val="2759777571"/>
+      </p:ext>
+    </p:extLst>
+  </p:cSld>
+  <p:clrMapOvr>
+    <a:masterClrMapping/>
+  </p:clrMapOvr>
+  <p:timing>
+    <p:tnLst>
+      <p:par>
+        <p:cTn id="1" dur="indefinite" restart="never" nodeType="tmRoot"/>
+      </p:par>
+    </p:tnLst>
+  </p:timing>
+</p:sld>
+</file>
+
+<file path=ppt/slides/slide16.xml><?xml version="1.0" encoding="utf-8"?>
+<p:sld xmlns:a="http://schemas.openxmlformats.org/drawingml/2006/main" xmlns:r="http://schemas.openxmlformats.org/officeDocument/2006/relationships" xmlns:p="http://schemas.openxmlformats.org/presentationml/2006/main">
+  <p:cSld>
+    <p:spTree>
+      <p:nvGrpSpPr>
+        <p:cNvPr id="1" name=""/>
+        <p:cNvGrpSpPr/>
+        <p:nvPr/>
+      </p:nvGrpSpPr>
+      <p:grpSpPr>
+        <a:xfrm>
+          <a:off x="0" y="0"/>
+          <a:ext cx="0" cy="0"/>
+          <a:chOff x="0" y="0"/>
+          <a:chExt cx="0" cy="0"/>
+        </a:xfrm>
+      </p:grpSpPr>
+      <p:pic>
+        <p:nvPicPr>
+          <p:cNvPr id="2" name="Picture 1"/>
+          <p:cNvPicPr>
+            <a:picLocks noChangeAspect="1"/>
+          </p:cNvPicPr>
+          <p:nvPr/>
+        </p:nvPicPr>
+        <p:blipFill>
+          <a:blip r:embed="rId2">
+            <a:extLst>
+              <a:ext uri="{28A0092B-C50C-407E-A947-70E740481C1C}">
+                <a14:useLocalDpi xmlns:a14="http://schemas.microsoft.com/office/drawing/2010/main" val="0"/>
+              </a:ext>
+            </a:extLst>
+          </a:blip>
+          <a:stretch>
+            <a:fillRect/>
+          </a:stretch>
+        </p:blipFill>
+        <p:spPr>
+          <a:xfrm>
             <a:off x="2362200" y="609600"/>
             <a:ext cx="4267200" cy="5582168"/>
           </a:xfrm>
@@ -4131,6 +4554,294 @@
     <p:extLst>
       <p:ext uri="{BB962C8B-B14F-4D97-AF65-F5344CB8AC3E}">
         <p14:creationId xmlns:p14="http://schemas.microsoft.com/office/powerpoint/2010/main" val="1977379917"/>
+      </p:ext>
+    </p:extLst>
+  </p:cSld>
+  <p:clrMapOvr>
+    <a:masterClrMapping/>
+  </p:clrMapOvr>
+  <p:timing>
+    <p:tnLst>
+      <p:par>
+        <p:cTn id="1" dur="indefinite" restart="never" nodeType="tmRoot"/>
+      </p:par>
+    </p:tnLst>
+  </p:timing>
+</p:sld>
+</file>
+
+<file path=ppt/slides/slide17.xml><?xml version="1.0" encoding="utf-8"?>
+<p:sld xmlns:a="http://schemas.openxmlformats.org/drawingml/2006/main" xmlns:r="http://schemas.openxmlformats.org/officeDocument/2006/relationships" xmlns:p="http://schemas.openxmlformats.org/presentationml/2006/main">
+  <p:cSld>
+    <p:spTree>
+      <p:nvGrpSpPr>
+        <p:cNvPr id="1" name=""/>
+        <p:cNvGrpSpPr/>
+        <p:nvPr/>
+      </p:nvGrpSpPr>
+      <p:grpSpPr>
+        <a:xfrm>
+          <a:off x="0" y="0"/>
+          <a:ext cx="0" cy="0"/>
+          <a:chOff x="0" y="0"/>
+          <a:chExt cx="0" cy="0"/>
+        </a:xfrm>
+      </p:grpSpPr>
+      <p:sp>
+        <p:nvSpPr>
+          <p:cNvPr id="3" name="Title 2"/>
+          <p:cNvSpPr>
+            <a:spLocks noGrp="1"/>
+          </p:cNvSpPr>
+          <p:nvPr>
+            <p:ph type="title"/>
+          </p:nvPr>
+        </p:nvSpPr>
+        <p:spPr>
+          <a:xfrm>
+            <a:off x="762000" y="457200"/>
+            <a:ext cx="7543800" cy="914400"/>
+          </a:xfrm>
+        </p:spPr>
+        <p:txBody>
+          <a:bodyPr/>
+          <a:lstStyle/>
+          <a:p>
+            <a:pPr algn="ctr"/>
+            <a:r>
+              <a:rPr lang="en-US" dirty="0" smtClean="0"/>
+              <a:t>Results</a:t>
+            </a:r>
+            <a:endParaRPr lang="en-US" dirty="0"/>
+          </a:p>
+        </p:txBody>
+      </p:sp>
+      <p:pic>
+        <p:nvPicPr>
+          <p:cNvPr id="7" name="Picture 6"/>
+          <p:cNvPicPr>
+            <a:picLocks noChangeAspect="1"/>
+          </p:cNvPicPr>
+          <p:nvPr/>
+        </p:nvPicPr>
+        <p:blipFill>
+          <a:blip r:embed="rId2">
+            <a:extLst>
+              <a:ext uri="{28A0092B-C50C-407E-A947-70E740481C1C}">
+                <a14:useLocalDpi xmlns:a14="http://schemas.microsoft.com/office/drawing/2010/main" val="0"/>
+              </a:ext>
+            </a:extLst>
+          </a:blip>
+          <a:stretch>
+            <a:fillRect/>
+          </a:stretch>
+        </p:blipFill>
+        <p:spPr>
+          <a:xfrm>
+            <a:off x="1676400" y="1905000"/>
+            <a:ext cx="5715000" cy="3800475"/>
+          </a:xfrm>
+          <a:prstGeom prst="rect">
+            <a:avLst/>
+          </a:prstGeom>
+        </p:spPr>
+      </p:pic>
+    </p:spTree>
+    <p:extLst>
+      <p:ext uri="{BB962C8B-B14F-4D97-AF65-F5344CB8AC3E}">
+        <p14:creationId xmlns:p14="http://schemas.microsoft.com/office/powerpoint/2010/main" val="1358696404"/>
+      </p:ext>
+    </p:extLst>
+  </p:cSld>
+  <p:clrMapOvr>
+    <a:masterClrMapping/>
+  </p:clrMapOvr>
+  <p:timing>
+    <p:tnLst>
+      <p:par>
+        <p:cTn id="1" dur="indefinite" restart="never" nodeType="tmRoot"/>
+      </p:par>
+    </p:tnLst>
+  </p:timing>
+</p:sld>
+</file>
+
+<file path=ppt/slides/slide18.xml><?xml version="1.0" encoding="utf-8"?>
+<p:sld xmlns:a="http://schemas.openxmlformats.org/drawingml/2006/main" xmlns:r="http://schemas.openxmlformats.org/officeDocument/2006/relationships" xmlns:p="http://schemas.openxmlformats.org/presentationml/2006/main">
+  <p:cSld>
+    <p:spTree>
+      <p:nvGrpSpPr>
+        <p:cNvPr id="1" name=""/>
+        <p:cNvGrpSpPr/>
+        <p:nvPr/>
+      </p:nvGrpSpPr>
+      <p:grpSpPr>
+        <a:xfrm>
+          <a:off x="0" y="0"/>
+          <a:ext cx="0" cy="0"/>
+          <a:chOff x="0" y="0"/>
+          <a:chExt cx="0" cy="0"/>
+        </a:xfrm>
+      </p:grpSpPr>
+      <p:sp>
+        <p:nvSpPr>
+          <p:cNvPr id="3" name="Title 2"/>
+          <p:cNvSpPr>
+            <a:spLocks noGrp="1"/>
+          </p:cNvSpPr>
+          <p:nvPr>
+            <p:ph type="title"/>
+          </p:nvPr>
+        </p:nvSpPr>
+        <p:spPr>
+          <a:xfrm>
+            <a:off x="762000" y="457200"/>
+            <a:ext cx="7543800" cy="914400"/>
+          </a:xfrm>
+        </p:spPr>
+        <p:txBody>
+          <a:bodyPr/>
+          <a:lstStyle/>
+          <a:p>
+            <a:pPr algn="ctr"/>
+            <a:r>
+              <a:rPr lang="en-US" dirty="0" smtClean="0"/>
+              <a:t>Results</a:t>
+            </a:r>
+            <a:endParaRPr lang="en-US" dirty="0"/>
+          </a:p>
+        </p:txBody>
+      </p:sp>
+      <p:pic>
+        <p:nvPicPr>
+          <p:cNvPr id="2" name="Picture 1"/>
+          <p:cNvPicPr>
+            <a:picLocks noChangeAspect="1"/>
+          </p:cNvPicPr>
+          <p:nvPr/>
+        </p:nvPicPr>
+        <p:blipFill>
+          <a:blip r:embed="rId2">
+            <a:extLst>
+              <a:ext uri="{28A0092B-C50C-407E-A947-70E740481C1C}">
+                <a14:useLocalDpi xmlns:a14="http://schemas.microsoft.com/office/drawing/2010/main" val="0"/>
+              </a:ext>
+            </a:extLst>
+          </a:blip>
+          <a:stretch>
+            <a:fillRect/>
+          </a:stretch>
+        </p:blipFill>
+        <p:spPr>
+          <a:xfrm>
+            <a:off x="2957512" y="1828800"/>
+            <a:ext cx="3152775" cy="4124325"/>
+          </a:xfrm>
+          <a:prstGeom prst="rect">
+            <a:avLst/>
+          </a:prstGeom>
+        </p:spPr>
+      </p:pic>
+    </p:spTree>
+    <p:extLst>
+      <p:ext uri="{BB962C8B-B14F-4D97-AF65-F5344CB8AC3E}">
+        <p14:creationId xmlns:p14="http://schemas.microsoft.com/office/powerpoint/2010/main" val="168528255"/>
+      </p:ext>
+    </p:extLst>
+  </p:cSld>
+  <p:clrMapOvr>
+    <a:masterClrMapping/>
+  </p:clrMapOvr>
+  <p:timing>
+    <p:tnLst>
+      <p:par>
+        <p:cTn id="1" dur="indefinite" restart="never" nodeType="tmRoot"/>
+      </p:par>
+    </p:tnLst>
+  </p:timing>
+</p:sld>
+</file>
+
+<file path=ppt/slides/slide19.xml><?xml version="1.0" encoding="utf-8"?>
+<p:sld xmlns:a="http://schemas.openxmlformats.org/drawingml/2006/main" xmlns:r="http://schemas.openxmlformats.org/officeDocument/2006/relationships" xmlns:p="http://schemas.openxmlformats.org/presentationml/2006/main">
+  <p:cSld>
+    <p:spTree>
+      <p:nvGrpSpPr>
+        <p:cNvPr id="1" name=""/>
+        <p:cNvGrpSpPr/>
+        <p:nvPr/>
+      </p:nvGrpSpPr>
+      <p:grpSpPr>
+        <a:xfrm>
+          <a:off x="0" y="0"/>
+          <a:ext cx="0" cy="0"/>
+          <a:chOff x="0" y="0"/>
+          <a:chExt cx="0" cy="0"/>
+        </a:xfrm>
+      </p:grpSpPr>
+      <p:sp>
+        <p:nvSpPr>
+          <p:cNvPr id="3" name="Title 2"/>
+          <p:cNvSpPr>
+            <a:spLocks noGrp="1"/>
+          </p:cNvSpPr>
+          <p:nvPr>
+            <p:ph type="title"/>
+          </p:nvPr>
+        </p:nvSpPr>
+        <p:spPr>
+          <a:xfrm>
+            <a:off x="762000" y="457200"/>
+            <a:ext cx="7543800" cy="914400"/>
+          </a:xfrm>
+        </p:spPr>
+        <p:txBody>
+          <a:bodyPr/>
+          <a:lstStyle/>
+          <a:p>
+            <a:pPr algn="ctr"/>
+            <a:r>
+              <a:rPr lang="en-US" dirty="0" smtClean="0"/>
+              <a:t>Results</a:t>
+            </a:r>
+            <a:endParaRPr lang="en-US" dirty="0"/>
+          </a:p>
+        </p:txBody>
+      </p:sp>
+      <p:pic>
+        <p:nvPicPr>
+          <p:cNvPr id="4" name="Picture 3"/>
+          <p:cNvPicPr>
+            <a:picLocks noChangeAspect="1"/>
+          </p:cNvPicPr>
+          <p:nvPr/>
+        </p:nvPicPr>
+        <p:blipFill>
+          <a:blip r:embed="rId2">
+            <a:extLst>
+              <a:ext uri="{28A0092B-C50C-407E-A947-70E740481C1C}">
+                <a14:useLocalDpi xmlns:a14="http://schemas.microsoft.com/office/drawing/2010/main" val="0"/>
+              </a:ext>
+            </a:extLst>
+          </a:blip>
+          <a:stretch>
+            <a:fillRect/>
+          </a:stretch>
+        </p:blipFill>
+        <p:spPr>
+          <a:xfrm>
+            <a:off x="2898569" y="1524000"/>
+            <a:ext cx="3270662" cy="4918769"/>
+          </a:xfrm>
+          <a:prstGeom prst="rect">
+            <a:avLst/>
+          </a:prstGeom>
+        </p:spPr>
+      </p:pic>
+    </p:spTree>
+    <p:extLst>
+      <p:ext uri="{BB962C8B-B14F-4D97-AF65-F5344CB8AC3E}">
+        <p14:creationId xmlns:p14="http://schemas.microsoft.com/office/powerpoint/2010/main" val="2343869005"/>
       </p:ext>
     </p:extLst>
   </p:cSld>
@@ -4303,6 +5014,552 @@
 </p:sld>
 </file>
 
+<file path=ppt/slides/slide20.xml><?xml version="1.0" encoding="utf-8"?>
+<p:sld xmlns:a="http://schemas.openxmlformats.org/drawingml/2006/main" xmlns:r="http://schemas.openxmlformats.org/officeDocument/2006/relationships" xmlns:p="http://schemas.openxmlformats.org/presentationml/2006/main">
+  <p:cSld>
+    <p:spTree>
+      <p:nvGrpSpPr>
+        <p:cNvPr id="1" name=""/>
+        <p:cNvGrpSpPr/>
+        <p:nvPr/>
+      </p:nvGrpSpPr>
+      <p:grpSpPr>
+        <a:xfrm>
+          <a:off x="0" y="0"/>
+          <a:ext cx="0" cy="0"/>
+          <a:chOff x="0" y="0"/>
+          <a:chExt cx="0" cy="0"/>
+        </a:xfrm>
+      </p:grpSpPr>
+      <p:sp>
+        <p:nvSpPr>
+          <p:cNvPr id="3" name="Title 2"/>
+          <p:cNvSpPr>
+            <a:spLocks noGrp="1"/>
+          </p:cNvSpPr>
+          <p:nvPr>
+            <p:ph type="title"/>
+          </p:nvPr>
+        </p:nvSpPr>
+        <p:spPr>
+          <a:xfrm>
+            <a:off x="762000" y="457200"/>
+            <a:ext cx="7543800" cy="914400"/>
+          </a:xfrm>
+        </p:spPr>
+        <p:txBody>
+          <a:bodyPr/>
+          <a:lstStyle/>
+          <a:p>
+            <a:pPr algn="ctr"/>
+            <a:r>
+              <a:rPr lang="en-US" dirty="0" smtClean="0"/>
+              <a:t>Results</a:t>
+            </a:r>
+            <a:endParaRPr lang="en-US" dirty="0"/>
+          </a:p>
+        </p:txBody>
+      </p:sp>
+      <p:pic>
+        <p:nvPicPr>
+          <p:cNvPr id="2" name="Picture 1"/>
+          <p:cNvPicPr>
+            <a:picLocks noChangeAspect="1"/>
+          </p:cNvPicPr>
+          <p:nvPr/>
+        </p:nvPicPr>
+        <p:blipFill>
+          <a:blip r:embed="rId2">
+            <a:extLst>
+              <a:ext uri="{28A0092B-C50C-407E-A947-70E740481C1C}">
+                <a14:useLocalDpi xmlns:a14="http://schemas.microsoft.com/office/drawing/2010/main" val="0"/>
+              </a:ext>
+            </a:extLst>
+          </a:blip>
+          <a:stretch>
+            <a:fillRect/>
+          </a:stretch>
+        </p:blipFill>
+        <p:spPr>
+          <a:xfrm>
+            <a:off x="3252787" y="2047875"/>
+            <a:ext cx="2638425" cy="2762250"/>
+          </a:xfrm>
+          <a:prstGeom prst="rect">
+            <a:avLst/>
+          </a:prstGeom>
+        </p:spPr>
+      </p:pic>
+    </p:spTree>
+    <p:extLst>
+      <p:ext uri="{BB962C8B-B14F-4D97-AF65-F5344CB8AC3E}">
+        <p14:creationId xmlns:p14="http://schemas.microsoft.com/office/powerpoint/2010/main" val="1706206730"/>
+      </p:ext>
+    </p:extLst>
+  </p:cSld>
+  <p:clrMapOvr>
+    <a:masterClrMapping/>
+  </p:clrMapOvr>
+  <p:timing>
+    <p:tnLst>
+      <p:par>
+        <p:cTn id="1" dur="indefinite" restart="never" nodeType="tmRoot"/>
+      </p:par>
+    </p:tnLst>
+  </p:timing>
+</p:sld>
+</file>
+
+<file path=ppt/slides/slide21.xml><?xml version="1.0" encoding="utf-8"?>
+<p:sld xmlns:a="http://schemas.openxmlformats.org/drawingml/2006/main" xmlns:r="http://schemas.openxmlformats.org/officeDocument/2006/relationships" xmlns:p="http://schemas.openxmlformats.org/presentationml/2006/main">
+  <p:cSld>
+    <p:spTree>
+      <p:nvGrpSpPr>
+        <p:cNvPr id="1" name=""/>
+        <p:cNvGrpSpPr/>
+        <p:nvPr/>
+      </p:nvGrpSpPr>
+      <p:grpSpPr>
+        <a:xfrm>
+          <a:off x="0" y="0"/>
+          <a:ext cx="0" cy="0"/>
+          <a:chOff x="0" y="0"/>
+          <a:chExt cx="0" cy="0"/>
+        </a:xfrm>
+      </p:grpSpPr>
+      <p:sp>
+        <p:nvSpPr>
+          <p:cNvPr id="3" name="Title 2"/>
+          <p:cNvSpPr>
+            <a:spLocks noGrp="1"/>
+          </p:cNvSpPr>
+          <p:nvPr>
+            <p:ph type="title"/>
+          </p:nvPr>
+        </p:nvSpPr>
+        <p:spPr>
+          <a:xfrm>
+            <a:off x="762000" y="457200"/>
+            <a:ext cx="7543800" cy="914400"/>
+          </a:xfrm>
+        </p:spPr>
+        <p:txBody>
+          <a:bodyPr/>
+          <a:lstStyle/>
+          <a:p>
+            <a:pPr algn="ctr"/>
+            <a:r>
+              <a:rPr lang="en-US" dirty="0" smtClean="0"/>
+              <a:t>Results</a:t>
+            </a:r>
+            <a:endParaRPr lang="en-US" dirty="0"/>
+          </a:p>
+        </p:txBody>
+      </p:sp>
+      <p:pic>
+        <p:nvPicPr>
+          <p:cNvPr id="4" name="Picture 3"/>
+          <p:cNvPicPr>
+            <a:picLocks noChangeAspect="1"/>
+          </p:cNvPicPr>
+          <p:nvPr/>
+        </p:nvPicPr>
+        <p:blipFill>
+          <a:blip r:embed="rId2">
+            <a:extLst>
+              <a:ext uri="{28A0092B-C50C-407E-A947-70E740481C1C}">
+                <a14:useLocalDpi xmlns:a14="http://schemas.microsoft.com/office/drawing/2010/main" val="0"/>
+              </a:ext>
+            </a:extLst>
+          </a:blip>
+          <a:stretch>
+            <a:fillRect/>
+          </a:stretch>
+        </p:blipFill>
+        <p:spPr>
+          <a:xfrm>
+            <a:off x="685800" y="1600200"/>
+            <a:ext cx="7696200" cy="4810125"/>
+          </a:xfrm>
+          <a:prstGeom prst="rect">
+            <a:avLst/>
+          </a:prstGeom>
+        </p:spPr>
+      </p:pic>
+    </p:spTree>
+    <p:extLst>
+      <p:ext uri="{BB962C8B-B14F-4D97-AF65-F5344CB8AC3E}">
+        <p14:creationId xmlns:p14="http://schemas.microsoft.com/office/powerpoint/2010/main" val="3500615798"/>
+      </p:ext>
+    </p:extLst>
+  </p:cSld>
+  <p:clrMapOvr>
+    <a:masterClrMapping/>
+  </p:clrMapOvr>
+  <p:timing>
+    <p:tnLst>
+      <p:par>
+        <p:cTn id="1" dur="indefinite" restart="never" nodeType="tmRoot"/>
+      </p:par>
+    </p:tnLst>
+  </p:timing>
+</p:sld>
+</file>
+
+<file path=ppt/slides/slide22.xml><?xml version="1.0" encoding="utf-8"?>
+<p:sld xmlns:a="http://schemas.openxmlformats.org/drawingml/2006/main" xmlns:r="http://schemas.openxmlformats.org/officeDocument/2006/relationships" xmlns:p="http://schemas.openxmlformats.org/presentationml/2006/main">
+  <p:cSld>
+    <p:spTree>
+      <p:nvGrpSpPr>
+        <p:cNvPr id="1" name=""/>
+        <p:cNvGrpSpPr/>
+        <p:nvPr/>
+      </p:nvGrpSpPr>
+      <p:grpSpPr>
+        <a:xfrm>
+          <a:off x="0" y="0"/>
+          <a:ext cx="0" cy="0"/>
+          <a:chOff x="0" y="0"/>
+          <a:chExt cx="0" cy="0"/>
+        </a:xfrm>
+      </p:grpSpPr>
+      <p:sp>
+        <p:nvSpPr>
+          <p:cNvPr id="3" name="Title 2"/>
+          <p:cNvSpPr>
+            <a:spLocks noGrp="1"/>
+          </p:cNvSpPr>
+          <p:nvPr>
+            <p:ph type="title"/>
+          </p:nvPr>
+        </p:nvSpPr>
+        <p:spPr>
+          <a:xfrm>
+            <a:off x="762000" y="457200"/>
+            <a:ext cx="7543800" cy="914400"/>
+          </a:xfrm>
+        </p:spPr>
+        <p:txBody>
+          <a:bodyPr/>
+          <a:lstStyle/>
+          <a:p>
+            <a:pPr algn="ctr"/>
+            <a:r>
+              <a:rPr lang="en-US" dirty="0" smtClean="0"/>
+              <a:t>Results</a:t>
+            </a:r>
+            <a:endParaRPr lang="en-US" dirty="0"/>
+          </a:p>
+        </p:txBody>
+      </p:sp>
+      <p:pic>
+        <p:nvPicPr>
+          <p:cNvPr id="2" name="Picture 1"/>
+          <p:cNvPicPr>
+            <a:picLocks noChangeAspect="1"/>
+          </p:cNvPicPr>
+          <p:nvPr/>
+        </p:nvPicPr>
+        <p:blipFill>
+          <a:blip r:embed="rId2">
+            <a:extLst>
+              <a:ext uri="{28A0092B-C50C-407E-A947-70E740481C1C}">
+                <a14:useLocalDpi xmlns:a14="http://schemas.microsoft.com/office/drawing/2010/main" val="0"/>
+              </a:ext>
+            </a:extLst>
+          </a:blip>
+          <a:stretch>
+            <a:fillRect/>
+          </a:stretch>
+        </p:blipFill>
+        <p:spPr>
+          <a:xfrm>
+            <a:off x="1219200" y="1524000"/>
+            <a:ext cx="6629400" cy="4972050"/>
+          </a:xfrm>
+          <a:prstGeom prst="rect">
+            <a:avLst/>
+          </a:prstGeom>
+        </p:spPr>
+      </p:pic>
+    </p:spTree>
+    <p:extLst>
+      <p:ext uri="{BB962C8B-B14F-4D97-AF65-F5344CB8AC3E}">
+        <p14:creationId xmlns:p14="http://schemas.microsoft.com/office/powerpoint/2010/main" val="973997386"/>
+      </p:ext>
+    </p:extLst>
+  </p:cSld>
+  <p:clrMapOvr>
+    <a:masterClrMapping/>
+  </p:clrMapOvr>
+  <p:timing>
+    <p:tnLst>
+      <p:par>
+        <p:cTn id="1" dur="indefinite" restart="never" nodeType="tmRoot"/>
+      </p:par>
+    </p:tnLst>
+  </p:timing>
+</p:sld>
+</file>
+
+<file path=ppt/slides/slide23.xml><?xml version="1.0" encoding="utf-8"?>
+<p:sld xmlns:a="http://schemas.openxmlformats.org/drawingml/2006/main" xmlns:r="http://schemas.openxmlformats.org/officeDocument/2006/relationships" xmlns:p="http://schemas.openxmlformats.org/presentationml/2006/main">
+  <p:cSld>
+    <p:spTree>
+      <p:nvGrpSpPr>
+        <p:cNvPr id="1" name=""/>
+        <p:cNvGrpSpPr/>
+        <p:nvPr/>
+      </p:nvGrpSpPr>
+      <p:grpSpPr>
+        <a:xfrm>
+          <a:off x="0" y="0"/>
+          <a:ext cx="0" cy="0"/>
+          <a:chOff x="0" y="0"/>
+          <a:chExt cx="0" cy="0"/>
+        </a:xfrm>
+      </p:grpSpPr>
+      <p:sp>
+        <p:nvSpPr>
+          <p:cNvPr id="3" name="Title 2"/>
+          <p:cNvSpPr>
+            <a:spLocks noGrp="1"/>
+          </p:cNvSpPr>
+          <p:nvPr>
+            <p:ph type="title"/>
+          </p:nvPr>
+        </p:nvSpPr>
+        <p:spPr>
+          <a:xfrm>
+            <a:off x="762000" y="457200"/>
+            <a:ext cx="7543800" cy="914400"/>
+          </a:xfrm>
+        </p:spPr>
+        <p:txBody>
+          <a:bodyPr/>
+          <a:lstStyle/>
+          <a:p>
+            <a:pPr algn="ctr"/>
+            <a:r>
+              <a:rPr lang="en-US" dirty="0" smtClean="0"/>
+              <a:t>Results</a:t>
+            </a:r>
+            <a:endParaRPr lang="en-US" dirty="0"/>
+          </a:p>
+        </p:txBody>
+      </p:sp>
+      <p:pic>
+        <p:nvPicPr>
+          <p:cNvPr id="4" name="Picture 3"/>
+          <p:cNvPicPr>
+            <a:picLocks noChangeAspect="1"/>
+          </p:cNvPicPr>
+          <p:nvPr/>
+        </p:nvPicPr>
+        <p:blipFill>
+          <a:blip r:embed="rId2">
+            <a:extLst>
+              <a:ext uri="{28A0092B-C50C-407E-A947-70E740481C1C}">
+                <a14:useLocalDpi xmlns:a14="http://schemas.microsoft.com/office/drawing/2010/main" val="0"/>
+              </a:ext>
+            </a:extLst>
+          </a:blip>
+          <a:stretch>
+            <a:fillRect/>
+          </a:stretch>
+        </p:blipFill>
+        <p:spPr>
+          <a:xfrm>
+            <a:off x="495300" y="2209800"/>
+            <a:ext cx="8077200" cy="3352800"/>
+          </a:xfrm>
+          <a:prstGeom prst="rect">
+            <a:avLst/>
+          </a:prstGeom>
+        </p:spPr>
+      </p:pic>
+    </p:spTree>
+    <p:extLst>
+      <p:ext uri="{BB962C8B-B14F-4D97-AF65-F5344CB8AC3E}">
+        <p14:creationId xmlns:p14="http://schemas.microsoft.com/office/powerpoint/2010/main" val="1618372194"/>
+      </p:ext>
+    </p:extLst>
+  </p:cSld>
+  <p:clrMapOvr>
+    <a:masterClrMapping/>
+  </p:clrMapOvr>
+  <p:timing>
+    <p:tnLst>
+      <p:par>
+        <p:cTn id="1" dur="indefinite" restart="never" nodeType="tmRoot"/>
+      </p:par>
+    </p:tnLst>
+  </p:timing>
+</p:sld>
+</file>
+
+<file path=ppt/slides/slide24.xml><?xml version="1.0" encoding="utf-8"?>
+<p:sld xmlns:a="http://schemas.openxmlformats.org/drawingml/2006/main" xmlns:r="http://schemas.openxmlformats.org/officeDocument/2006/relationships" xmlns:p="http://schemas.openxmlformats.org/presentationml/2006/main">
+  <p:cSld>
+    <p:spTree>
+      <p:nvGrpSpPr>
+        <p:cNvPr id="1" name=""/>
+        <p:cNvGrpSpPr/>
+        <p:nvPr/>
+      </p:nvGrpSpPr>
+      <p:grpSpPr>
+        <a:xfrm>
+          <a:off x="0" y="0"/>
+          <a:ext cx="0" cy="0"/>
+          <a:chOff x="0" y="0"/>
+          <a:chExt cx="0" cy="0"/>
+        </a:xfrm>
+      </p:grpSpPr>
+      <p:sp>
+        <p:nvSpPr>
+          <p:cNvPr id="3" name="Title 2"/>
+          <p:cNvSpPr>
+            <a:spLocks noGrp="1"/>
+          </p:cNvSpPr>
+          <p:nvPr>
+            <p:ph type="title"/>
+          </p:nvPr>
+        </p:nvSpPr>
+        <p:spPr>
+          <a:xfrm>
+            <a:off x="762000" y="457200"/>
+            <a:ext cx="7543800" cy="914400"/>
+          </a:xfrm>
+        </p:spPr>
+        <p:txBody>
+          <a:bodyPr/>
+          <a:lstStyle/>
+          <a:p>
+            <a:pPr algn="ctr"/>
+            <a:r>
+              <a:rPr lang="en-US" dirty="0" smtClean="0"/>
+              <a:t>Results</a:t>
+            </a:r>
+            <a:endParaRPr lang="en-US" dirty="0"/>
+          </a:p>
+        </p:txBody>
+      </p:sp>
+      <p:pic>
+        <p:nvPicPr>
+          <p:cNvPr id="2" name="Picture 1"/>
+          <p:cNvPicPr>
+            <a:picLocks noChangeAspect="1"/>
+          </p:cNvPicPr>
+          <p:nvPr/>
+        </p:nvPicPr>
+        <p:blipFill>
+          <a:blip r:embed="rId2">
+            <a:extLst>
+              <a:ext uri="{28A0092B-C50C-407E-A947-70E740481C1C}">
+                <a14:useLocalDpi xmlns:a14="http://schemas.microsoft.com/office/drawing/2010/main" val="0"/>
+              </a:ext>
+            </a:extLst>
+          </a:blip>
+          <a:stretch>
+            <a:fillRect/>
+          </a:stretch>
+        </p:blipFill>
+        <p:spPr>
+          <a:xfrm>
+            <a:off x="2133600" y="1600200"/>
+            <a:ext cx="4800600" cy="4800600"/>
+          </a:xfrm>
+          <a:prstGeom prst="rect">
+            <a:avLst/>
+          </a:prstGeom>
+        </p:spPr>
+      </p:pic>
+    </p:spTree>
+    <p:extLst>
+      <p:ext uri="{BB962C8B-B14F-4D97-AF65-F5344CB8AC3E}">
+        <p14:creationId xmlns:p14="http://schemas.microsoft.com/office/powerpoint/2010/main" val="1122911962"/>
+      </p:ext>
+    </p:extLst>
+  </p:cSld>
+  <p:clrMapOvr>
+    <a:masterClrMapping/>
+  </p:clrMapOvr>
+  <p:timing>
+    <p:tnLst>
+      <p:par>
+        <p:cTn id="1" dur="indefinite" restart="never" nodeType="tmRoot"/>
+      </p:par>
+    </p:tnLst>
+  </p:timing>
+</p:sld>
+</file>
+
+<file path=ppt/slides/slide25.xml><?xml version="1.0" encoding="utf-8"?>
+<p:sld xmlns:a="http://schemas.openxmlformats.org/drawingml/2006/main" xmlns:r="http://schemas.openxmlformats.org/officeDocument/2006/relationships" xmlns:p="http://schemas.openxmlformats.org/presentationml/2006/main">
+  <p:cSld>
+    <p:spTree>
+      <p:nvGrpSpPr>
+        <p:cNvPr id="1" name=""/>
+        <p:cNvGrpSpPr/>
+        <p:nvPr/>
+      </p:nvGrpSpPr>
+      <p:grpSpPr>
+        <a:xfrm>
+          <a:off x="0" y="0"/>
+          <a:ext cx="0" cy="0"/>
+          <a:chOff x="0" y="0"/>
+          <a:chExt cx="0" cy="0"/>
+        </a:xfrm>
+      </p:grpSpPr>
+      <p:sp>
+        <p:nvSpPr>
+          <p:cNvPr id="3" name="Title 2"/>
+          <p:cNvSpPr>
+            <a:spLocks noGrp="1"/>
+          </p:cNvSpPr>
+          <p:nvPr>
+            <p:ph type="title"/>
+          </p:nvPr>
+        </p:nvSpPr>
+        <p:spPr>
+          <a:xfrm>
+            <a:off x="762000" y="457200"/>
+            <a:ext cx="7543800" cy="914400"/>
+          </a:xfrm>
+        </p:spPr>
+        <p:txBody>
+          <a:bodyPr/>
+          <a:lstStyle/>
+          <a:p>
+            <a:pPr algn="ctr"/>
+            <a:r>
+              <a:rPr lang="en-US" dirty="0" smtClean="0"/>
+              <a:t>Thank You!</a:t>
+            </a:r>
+            <a:endParaRPr lang="en-US" dirty="0"/>
+          </a:p>
+        </p:txBody>
+      </p:sp>
+    </p:spTree>
+    <p:extLst>
+      <p:ext uri="{BB962C8B-B14F-4D97-AF65-F5344CB8AC3E}">
+        <p14:creationId xmlns:p14="http://schemas.microsoft.com/office/powerpoint/2010/main" val="1653188634"/>
+      </p:ext>
+    </p:extLst>
+  </p:cSld>
+  <p:clrMapOvr>
+    <a:masterClrMapping/>
+  </p:clrMapOvr>
+  <p:timing>
+    <p:tnLst>
+      <p:par>
+        <p:cTn id="1" dur="indefinite" restart="never" nodeType="tmRoot"/>
+      </p:par>
+    </p:tnLst>
+  </p:timing>
+</p:sld>
+</file>
+
 <file path=ppt/slides/slide3.xml><?xml version="1.0" encoding="utf-8"?>
 <p:sld xmlns:a="http://schemas.openxmlformats.org/drawingml/2006/main" xmlns:r="http://schemas.openxmlformats.org/officeDocument/2006/relationships" xmlns:p="http://schemas.openxmlformats.org/presentationml/2006/main">
   <p:cSld>
@@ -4379,7 +5636,6 @@
               <a:rPr lang="en-US" sz="2400" dirty="0" smtClean="0"/>
               <a:t>Program uses third-party feature detection code</a:t>
             </a:r>
-            <a:endParaRPr lang="en-US" sz="2400" dirty="0" smtClean="0"/>
           </a:p>
           <a:p>
             <a:pPr marL="342900" indent="-342900">
@@ -4527,7 +5783,6 @@
               <a:rPr lang="en-US" sz="2400" dirty="0" smtClean="0"/>
               <a:t>into a lot of false positives</a:t>
             </a:r>
-            <a:endParaRPr lang="en-US" sz="2400" dirty="0" smtClean="0"/>
           </a:p>
           <a:p>
             <a:pPr marL="342900" indent="-342900">

</xml_diff>

<commit_message>
Add blending slides to presentation.
</commit_message>
<xml_diff>
--- a/FinalReport/Automatic Face Detection & Replacement Slideshow.pptx
+++ b/FinalReport/Automatic Face Detection & Replacement Slideshow.pptx
@@ -4,6 +4,9 @@
   <p:sldMasterIdLst>
     <p:sldMasterId id="2147483660" r:id="rId1"/>
   </p:sldMasterIdLst>
+  <p:notesMasterIdLst>
+    <p:notesMasterId r:id="rId27"/>
+  </p:notesMasterIdLst>
   <p:sldIdLst>
     <p:sldId id="256" r:id="rId2"/>
     <p:sldId id="257" r:id="rId3"/>
@@ -20,11 +23,11 @@
     <p:sldId id="271" r:id="rId14"/>
     <p:sldId id="280" r:id="rId15"/>
     <p:sldId id="281" r:id="rId16"/>
-    <p:sldId id="269" r:id="rId17"/>
-    <p:sldId id="270" r:id="rId18"/>
-    <p:sldId id="272" r:id="rId19"/>
-    <p:sldId id="273" r:id="rId20"/>
-    <p:sldId id="274" r:id="rId21"/>
+    <p:sldId id="283" r:id="rId17"/>
+    <p:sldId id="284" r:id="rId18"/>
+    <p:sldId id="285" r:id="rId19"/>
+    <p:sldId id="270" r:id="rId20"/>
+    <p:sldId id="286" r:id="rId21"/>
     <p:sldId id="275" r:id="rId22"/>
     <p:sldId id="276" r:id="rId23"/>
     <p:sldId id="277" r:id="rId24"/>
@@ -147,6 +150,443 @@
 </p:presentation>
 </file>
 
+<file path=ppt/notesMasters/notesMaster1.xml><?xml version="1.0" encoding="utf-8"?>
+<p:notesMaster xmlns:a="http://schemas.openxmlformats.org/drawingml/2006/main" xmlns:r="http://schemas.openxmlformats.org/officeDocument/2006/relationships" xmlns:p="http://schemas.openxmlformats.org/presentationml/2006/main">
+  <p:cSld>
+    <p:bg>
+      <p:bgRef idx="1001">
+        <a:schemeClr val="bg1"/>
+      </p:bgRef>
+    </p:bg>
+    <p:spTree>
+      <p:nvGrpSpPr>
+        <p:cNvPr id="1" name=""/>
+        <p:cNvGrpSpPr/>
+        <p:nvPr/>
+      </p:nvGrpSpPr>
+      <p:grpSpPr>
+        <a:xfrm>
+          <a:off x="0" y="0"/>
+          <a:ext cx="0" cy="0"/>
+          <a:chOff x="0" y="0"/>
+          <a:chExt cx="0" cy="0"/>
+        </a:xfrm>
+      </p:grpSpPr>
+      <p:sp>
+        <p:nvSpPr>
+          <p:cNvPr id="2" name="Header Placeholder 1"/>
+          <p:cNvSpPr>
+            <a:spLocks noGrp="1"/>
+          </p:cNvSpPr>
+          <p:nvPr>
+            <p:ph type="hdr" sz="quarter"/>
+          </p:nvPr>
+        </p:nvSpPr>
+        <p:spPr>
+          <a:xfrm>
+            <a:off x="0" y="0"/>
+            <a:ext cx="2971800" cy="458788"/>
+          </a:xfrm>
+          <a:prstGeom prst="rect">
+            <a:avLst/>
+          </a:prstGeom>
+        </p:spPr>
+        <p:txBody>
+          <a:bodyPr vert="horz" lIns="91440" tIns="45720" rIns="91440" bIns="45720" rtlCol="0"/>
+          <a:lstStyle>
+            <a:lvl1pPr algn="l">
+              <a:defRPr sz="1200"/>
+            </a:lvl1pPr>
+          </a:lstStyle>
+          <a:p>
+            <a:endParaRPr lang="en-US"/>
+          </a:p>
+        </p:txBody>
+      </p:sp>
+      <p:sp>
+        <p:nvSpPr>
+          <p:cNvPr id="3" name="Date Placeholder 2"/>
+          <p:cNvSpPr>
+            <a:spLocks noGrp="1"/>
+          </p:cNvSpPr>
+          <p:nvPr>
+            <p:ph type="dt" idx="1"/>
+          </p:nvPr>
+        </p:nvSpPr>
+        <p:spPr>
+          <a:xfrm>
+            <a:off x="3884613" y="0"/>
+            <a:ext cx="2971800" cy="458788"/>
+          </a:xfrm>
+          <a:prstGeom prst="rect">
+            <a:avLst/>
+          </a:prstGeom>
+        </p:spPr>
+        <p:txBody>
+          <a:bodyPr vert="horz" lIns="91440" tIns="45720" rIns="91440" bIns="45720" rtlCol="0"/>
+          <a:lstStyle>
+            <a:lvl1pPr algn="r">
+              <a:defRPr sz="1200"/>
+            </a:lvl1pPr>
+          </a:lstStyle>
+          <a:p>
+            <a:fld id="{2B6C629E-67BD-42CA-832E-5818DD109DB4}" type="datetimeFigureOut">
+              <a:rPr lang="en-US" smtClean="0"/>
+              <a:t>12/18/2014</a:t>
+            </a:fld>
+            <a:endParaRPr lang="en-US"/>
+          </a:p>
+        </p:txBody>
+      </p:sp>
+      <p:sp>
+        <p:nvSpPr>
+          <p:cNvPr id="4" name="Slide Image Placeholder 3"/>
+          <p:cNvSpPr>
+            <a:spLocks noGrp="1" noRot="1" noChangeAspect="1"/>
+          </p:cNvSpPr>
+          <p:nvPr>
+            <p:ph type="sldImg" idx="2"/>
+          </p:nvPr>
+        </p:nvSpPr>
+        <p:spPr>
+          <a:xfrm>
+            <a:off x="1371600" y="1143000"/>
+            <a:ext cx="4114800" cy="3086100"/>
+          </a:xfrm>
+          <a:prstGeom prst="rect">
+            <a:avLst/>
+          </a:prstGeom>
+          <a:noFill/>
+          <a:ln w="12700">
+            <a:solidFill>
+              <a:prstClr val="black"/>
+            </a:solidFill>
+          </a:ln>
+        </p:spPr>
+        <p:txBody>
+          <a:bodyPr vert="horz" lIns="91440" tIns="45720" rIns="91440" bIns="45720" rtlCol="0" anchor="ctr"/>
+          <a:lstStyle/>
+          <a:p>
+            <a:endParaRPr lang="en-US"/>
+          </a:p>
+        </p:txBody>
+      </p:sp>
+      <p:sp>
+        <p:nvSpPr>
+          <p:cNvPr id="5" name="Notes Placeholder 4"/>
+          <p:cNvSpPr>
+            <a:spLocks noGrp="1"/>
+          </p:cNvSpPr>
+          <p:nvPr>
+            <p:ph type="body" sz="quarter" idx="3"/>
+          </p:nvPr>
+        </p:nvSpPr>
+        <p:spPr>
+          <a:xfrm>
+            <a:off x="685800" y="4400550"/>
+            <a:ext cx="5486400" cy="3600450"/>
+          </a:xfrm>
+          <a:prstGeom prst="rect">
+            <a:avLst/>
+          </a:prstGeom>
+        </p:spPr>
+        <p:txBody>
+          <a:bodyPr vert="horz" lIns="91440" tIns="45720" rIns="91440" bIns="45720" rtlCol="0"/>
+          <a:lstStyle/>
+          <a:p>
+            <a:pPr lvl="0"/>
+            <a:r>
+              <a:rPr lang="en-US" smtClean="0"/>
+              <a:t>Click to edit Master text styles</a:t>
+            </a:r>
+          </a:p>
+          <a:p>
+            <a:pPr lvl="1"/>
+            <a:r>
+              <a:rPr lang="en-US" smtClean="0"/>
+              <a:t>Second level</a:t>
+            </a:r>
+          </a:p>
+          <a:p>
+            <a:pPr lvl="2"/>
+            <a:r>
+              <a:rPr lang="en-US" smtClean="0"/>
+              <a:t>Third level</a:t>
+            </a:r>
+          </a:p>
+          <a:p>
+            <a:pPr lvl="3"/>
+            <a:r>
+              <a:rPr lang="en-US" smtClean="0"/>
+              <a:t>Fourth level</a:t>
+            </a:r>
+          </a:p>
+          <a:p>
+            <a:pPr lvl="4"/>
+            <a:r>
+              <a:rPr lang="en-US" smtClean="0"/>
+              <a:t>Fifth level</a:t>
+            </a:r>
+            <a:endParaRPr lang="en-US"/>
+          </a:p>
+        </p:txBody>
+      </p:sp>
+      <p:sp>
+        <p:nvSpPr>
+          <p:cNvPr id="6" name="Footer Placeholder 5"/>
+          <p:cNvSpPr>
+            <a:spLocks noGrp="1"/>
+          </p:cNvSpPr>
+          <p:nvPr>
+            <p:ph type="ftr" sz="quarter" idx="4"/>
+          </p:nvPr>
+        </p:nvSpPr>
+        <p:spPr>
+          <a:xfrm>
+            <a:off x="0" y="8685213"/>
+            <a:ext cx="2971800" cy="458787"/>
+          </a:xfrm>
+          <a:prstGeom prst="rect">
+            <a:avLst/>
+          </a:prstGeom>
+        </p:spPr>
+        <p:txBody>
+          <a:bodyPr vert="horz" lIns="91440" tIns="45720" rIns="91440" bIns="45720" rtlCol="0" anchor="b"/>
+          <a:lstStyle>
+            <a:lvl1pPr algn="l">
+              <a:defRPr sz="1200"/>
+            </a:lvl1pPr>
+          </a:lstStyle>
+          <a:p>
+            <a:endParaRPr lang="en-US"/>
+          </a:p>
+        </p:txBody>
+      </p:sp>
+      <p:sp>
+        <p:nvSpPr>
+          <p:cNvPr id="7" name="Slide Number Placeholder 6"/>
+          <p:cNvSpPr>
+            <a:spLocks noGrp="1"/>
+          </p:cNvSpPr>
+          <p:nvPr>
+            <p:ph type="sldNum" sz="quarter" idx="5"/>
+          </p:nvPr>
+        </p:nvSpPr>
+        <p:spPr>
+          <a:xfrm>
+            <a:off x="3884613" y="8685213"/>
+            <a:ext cx="2971800" cy="458787"/>
+          </a:xfrm>
+          <a:prstGeom prst="rect">
+            <a:avLst/>
+          </a:prstGeom>
+        </p:spPr>
+        <p:txBody>
+          <a:bodyPr vert="horz" lIns="91440" tIns="45720" rIns="91440" bIns="45720" rtlCol="0" anchor="b"/>
+          <a:lstStyle>
+            <a:lvl1pPr algn="r">
+              <a:defRPr sz="1200"/>
+            </a:lvl1pPr>
+          </a:lstStyle>
+          <a:p>
+            <a:fld id="{13D8A6C1-74C6-438F-8B2B-F0A9CE587869}" type="slidenum">
+              <a:rPr lang="en-US" smtClean="0"/>
+              <a:t>‹#›</a:t>
+            </a:fld>
+            <a:endParaRPr lang="en-US"/>
+          </a:p>
+        </p:txBody>
+      </p:sp>
+    </p:spTree>
+    <p:extLst>
+      <p:ext uri="{BB962C8B-B14F-4D97-AF65-F5344CB8AC3E}">
+        <p14:creationId xmlns:p14="http://schemas.microsoft.com/office/powerpoint/2010/main" val="3237091721"/>
+      </p:ext>
+    </p:extLst>
+  </p:cSld>
+  <p:clrMap bg1="lt1" tx1="dk1" bg2="lt2" tx2="dk2" accent1="accent1" accent2="accent2" accent3="accent3" accent4="accent4" accent5="accent5" accent6="accent6" hlink="hlink" folHlink="folHlink"/>
+  <p:notesStyle>
+    <a:lvl1pPr marL="0" algn="l" defTabSz="914400" rtl="0" eaLnBrk="1" latinLnBrk="0" hangingPunct="1">
+      <a:defRPr sz="1200" kern="1200">
+        <a:solidFill>
+          <a:schemeClr val="tx1"/>
+        </a:solidFill>
+        <a:latin typeface="+mn-lt"/>
+        <a:ea typeface="+mn-ea"/>
+        <a:cs typeface="+mn-cs"/>
+      </a:defRPr>
+    </a:lvl1pPr>
+    <a:lvl2pPr marL="457200" algn="l" defTabSz="914400" rtl="0" eaLnBrk="1" latinLnBrk="0" hangingPunct="1">
+      <a:defRPr sz="1200" kern="1200">
+        <a:solidFill>
+          <a:schemeClr val="tx1"/>
+        </a:solidFill>
+        <a:latin typeface="+mn-lt"/>
+        <a:ea typeface="+mn-ea"/>
+        <a:cs typeface="+mn-cs"/>
+      </a:defRPr>
+    </a:lvl2pPr>
+    <a:lvl3pPr marL="914400" algn="l" defTabSz="914400" rtl="0" eaLnBrk="1" latinLnBrk="0" hangingPunct="1">
+      <a:defRPr sz="1200" kern="1200">
+        <a:solidFill>
+          <a:schemeClr val="tx1"/>
+        </a:solidFill>
+        <a:latin typeface="+mn-lt"/>
+        <a:ea typeface="+mn-ea"/>
+        <a:cs typeface="+mn-cs"/>
+      </a:defRPr>
+    </a:lvl3pPr>
+    <a:lvl4pPr marL="1371600" algn="l" defTabSz="914400" rtl="0" eaLnBrk="1" latinLnBrk="0" hangingPunct="1">
+      <a:defRPr sz="1200" kern="1200">
+        <a:solidFill>
+          <a:schemeClr val="tx1"/>
+        </a:solidFill>
+        <a:latin typeface="+mn-lt"/>
+        <a:ea typeface="+mn-ea"/>
+        <a:cs typeface="+mn-cs"/>
+      </a:defRPr>
+    </a:lvl4pPr>
+    <a:lvl5pPr marL="1828800" algn="l" defTabSz="914400" rtl="0" eaLnBrk="1" latinLnBrk="0" hangingPunct="1">
+      <a:defRPr sz="1200" kern="1200">
+        <a:solidFill>
+          <a:schemeClr val="tx1"/>
+        </a:solidFill>
+        <a:latin typeface="+mn-lt"/>
+        <a:ea typeface="+mn-ea"/>
+        <a:cs typeface="+mn-cs"/>
+      </a:defRPr>
+    </a:lvl5pPr>
+    <a:lvl6pPr marL="2286000" algn="l" defTabSz="914400" rtl="0" eaLnBrk="1" latinLnBrk="0" hangingPunct="1">
+      <a:defRPr sz="1200" kern="1200">
+        <a:solidFill>
+          <a:schemeClr val="tx1"/>
+        </a:solidFill>
+        <a:latin typeface="+mn-lt"/>
+        <a:ea typeface="+mn-ea"/>
+        <a:cs typeface="+mn-cs"/>
+      </a:defRPr>
+    </a:lvl6pPr>
+    <a:lvl7pPr marL="2743200" algn="l" defTabSz="914400" rtl="0" eaLnBrk="1" latinLnBrk="0" hangingPunct="1">
+      <a:defRPr sz="1200" kern="1200">
+        <a:solidFill>
+          <a:schemeClr val="tx1"/>
+        </a:solidFill>
+        <a:latin typeface="+mn-lt"/>
+        <a:ea typeface="+mn-ea"/>
+        <a:cs typeface="+mn-cs"/>
+      </a:defRPr>
+    </a:lvl7pPr>
+    <a:lvl8pPr marL="3200400" algn="l" defTabSz="914400" rtl="0" eaLnBrk="1" latinLnBrk="0" hangingPunct="1">
+      <a:defRPr sz="1200" kern="1200">
+        <a:solidFill>
+          <a:schemeClr val="tx1"/>
+        </a:solidFill>
+        <a:latin typeface="+mn-lt"/>
+        <a:ea typeface="+mn-ea"/>
+        <a:cs typeface="+mn-cs"/>
+      </a:defRPr>
+    </a:lvl8pPr>
+    <a:lvl9pPr marL="3657600" algn="l" defTabSz="914400" rtl="0" eaLnBrk="1" latinLnBrk="0" hangingPunct="1">
+      <a:defRPr sz="1200" kern="1200">
+        <a:solidFill>
+          <a:schemeClr val="tx1"/>
+        </a:solidFill>
+        <a:latin typeface="+mn-lt"/>
+        <a:ea typeface="+mn-ea"/>
+        <a:cs typeface="+mn-cs"/>
+      </a:defRPr>
+    </a:lvl9pPr>
+  </p:notesStyle>
+</p:notesMaster>
+</file>
+
+<file path=ppt/notesSlides/notesSlide1.xml><?xml version="1.0" encoding="utf-8"?>
+<p:notes xmlns:a="http://schemas.openxmlformats.org/drawingml/2006/main" xmlns:r="http://schemas.openxmlformats.org/officeDocument/2006/relationships" xmlns:p="http://schemas.openxmlformats.org/presentationml/2006/main">
+  <p:cSld>
+    <p:spTree>
+      <p:nvGrpSpPr>
+        <p:cNvPr id="1" name=""/>
+        <p:cNvGrpSpPr/>
+        <p:nvPr/>
+      </p:nvGrpSpPr>
+      <p:grpSpPr>
+        <a:xfrm>
+          <a:off x="0" y="0"/>
+          <a:ext cx="0" cy="0"/>
+          <a:chOff x="0" y="0"/>
+          <a:chExt cx="0" cy="0"/>
+        </a:xfrm>
+      </p:grpSpPr>
+      <p:sp>
+        <p:nvSpPr>
+          <p:cNvPr id="2" name="Slide Image Placeholder 1"/>
+          <p:cNvSpPr>
+            <a:spLocks noGrp="1" noRot="1" noChangeAspect="1"/>
+          </p:cNvSpPr>
+          <p:nvPr>
+            <p:ph type="sldImg"/>
+          </p:nvPr>
+        </p:nvSpPr>
+        <p:spPr/>
+      </p:sp>
+      <p:sp>
+        <p:nvSpPr>
+          <p:cNvPr id="3" name="Notes Placeholder 2"/>
+          <p:cNvSpPr>
+            <a:spLocks noGrp="1"/>
+          </p:cNvSpPr>
+          <p:nvPr>
+            <p:ph type="body" idx="1"/>
+          </p:nvPr>
+        </p:nvSpPr>
+        <p:spPr/>
+        <p:txBody>
+          <a:bodyPr/>
+          <a:lstStyle/>
+          <a:p>
+            <a:r>
+              <a:rPr lang="en-US" dirty="0" smtClean="0"/>
+              <a:t>[High-level idea behind algorithm.]</a:t>
+            </a:r>
+          </a:p>
+        </p:txBody>
+      </p:sp>
+      <p:sp>
+        <p:nvSpPr>
+          <p:cNvPr id="4" name="Slide Number Placeholder 3"/>
+          <p:cNvSpPr>
+            <a:spLocks noGrp="1"/>
+          </p:cNvSpPr>
+          <p:nvPr>
+            <p:ph type="sldNum" sz="quarter" idx="10"/>
+          </p:nvPr>
+        </p:nvSpPr>
+        <p:spPr/>
+        <p:txBody>
+          <a:bodyPr/>
+          <a:lstStyle/>
+          <a:p>
+            <a:fld id="{13D8A6C1-74C6-438F-8B2B-F0A9CE587869}" type="slidenum">
+              <a:rPr lang="en-US" smtClean="0"/>
+              <a:t>15</a:t>
+            </a:fld>
+            <a:endParaRPr lang="en-US"/>
+          </a:p>
+        </p:txBody>
+      </p:sp>
+    </p:spTree>
+    <p:extLst>
+      <p:ext uri="{BB962C8B-B14F-4D97-AF65-F5344CB8AC3E}">
+        <p14:creationId xmlns:p14="http://schemas.microsoft.com/office/powerpoint/2010/main" val="120680958"/>
+      </p:ext>
+    </p:extLst>
+  </p:cSld>
+  <p:clrMapOvr>
+    <a:masterClrMapping/>
+  </p:clrMapOvr>
+</p:notes>
+</file>
+
 <file path=ppt/slideLayouts/slideLayout1.xml><?xml version="1.0" encoding="utf-8"?>
 <p:sldLayout xmlns:a="http://schemas.openxmlformats.org/drawingml/2006/main" xmlns:r="http://schemas.openxmlformats.org/officeDocument/2006/relationships" xmlns:p="http://schemas.openxmlformats.org/presentationml/2006/main" type="title" preserve="1">
   <p:cSld name="Title Slide">
@@ -384,7 +824,7 @@
           <a:p>
             <a:fld id="{1E324CB4-F072-414C-8921-E4602240F5B0}" type="datetimeFigureOut">
               <a:rPr lang="en-US" smtClean="0"/>
-              <a:t>12/17/2014</a:t>
+              <a:t>12/18/2014</a:t>
             </a:fld>
             <a:endParaRPr lang="en-US"/>
           </a:p>
@@ -554,7 +994,7 @@
           <a:p>
             <a:fld id="{1E324CB4-F072-414C-8921-E4602240F5B0}" type="datetimeFigureOut">
               <a:rPr lang="en-US" smtClean="0"/>
-              <a:t>12/17/2014</a:t>
+              <a:t>12/18/2014</a:t>
             </a:fld>
             <a:endParaRPr lang="en-US"/>
           </a:p>
@@ -729,7 +1169,7 @@
           <a:p>
             <a:fld id="{1E324CB4-F072-414C-8921-E4602240F5B0}" type="datetimeFigureOut">
               <a:rPr lang="en-US" smtClean="0"/>
-              <a:t>12/17/2014</a:t>
+              <a:t>12/18/2014</a:t>
             </a:fld>
             <a:endParaRPr lang="en-US"/>
           </a:p>
@@ -894,7 +1334,7 @@
           <a:p>
             <a:fld id="{1E324CB4-F072-414C-8921-E4602240F5B0}" type="datetimeFigureOut">
               <a:rPr lang="en-US" smtClean="0"/>
-              <a:t>12/17/2014</a:t>
+              <a:t>12/18/2014</a:t>
             </a:fld>
             <a:endParaRPr lang="en-US"/>
           </a:p>
@@ -1151,7 +1591,7 @@
           <a:p>
             <a:fld id="{1E324CB4-F072-414C-8921-E4602240F5B0}" type="datetimeFigureOut">
               <a:rPr lang="en-US" smtClean="0"/>
-              <a:t>12/17/2014</a:t>
+              <a:t>12/18/2014</a:t>
             </a:fld>
             <a:endParaRPr lang="en-US"/>
           </a:p>
@@ -1291,7 +1731,7 @@
           <a:p>
             <a:fld id="{1E324CB4-F072-414C-8921-E4602240F5B0}" type="datetimeFigureOut">
               <a:rPr lang="en-US" smtClean="0"/>
-              <a:t>12/17/2014</a:t>
+              <a:t>12/18/2014</a:t>
             </a:fld>
             <a:endParaRPr lang="en-US"/>
           </a:p>
@@ -1941,7 +2381,7 @@
           <a:p>
             <a:fld id="{1E324CB4-F072-414C-8921-E4602240F5B0}" type="datetimeFigureOut">
               <a:rPr lang="en-US" smtClean="0"/>
-              <a:t>12/17/2014</a:t>
+              <a:t>12/18/2014</a:t>
             </a:fld>
             <a:endParaRPr lang="en-US"/>
           </a:p>
@@ -2054,7 +2494,7 @@
           <a:p>
             <a:fld id="{1E324CB4-F072-414C-8921-E4602240F5B0}" type="datetimeFigureOut">
               <a:rPr lang="en-US" smtClean="0"/>
-              <a:t>12/17/2014</a:t>
+              <a:t>12/18/2014</a:t>
             </a:fld>
             <a:endParaRPr lang="en-US"/>
           </a:p>
@@ -2144,7 +2584,7 @@
           <a:p>
             <a:fld id="{1E324CB4-F072-414C-8921-E4602240F5B0}" type="datetimeFigureOut">
               <a:rPr lang="en-US" smtClean="0"/>
-              <a:t>12/17/2014</a:t>
+              <a:t>12/18/2014</a:t>
             </a:fld>
             <a:endParaRPr lang="en-US"/>
           </a:p>
@@ -2434,7 +2874,7 @@
           <a:p>
             <a:fld id="{1E324CB4-F072-414C-8921-E4602240F5B0}" type="datetimeFigureOut">
               <a:rPr lang="en-US" smtClean="0"/>
-              <a:t>12/17/2014</a:t>
+              <a:t>12/18/2014</a:t>
             </a:fld>
             <a:endParaRPr lang="en-US"/>
           </a:p>
@@ -2757,7 +3197,7 @@
           <a:p>
             <a:fld id="{1E324CB4-F072-414C-8921-E4602240F5B0}" type="datetimeFigureOut">
               <a:rPr lang="en-US" smtClean="0"/>
-              <a:t>12/17/2014</a:t>
+              <a:t>12/18/2014</a:t>
             </a:fld>
             <a:endParaRPr lang="en-US"/>
           </a:p>
@@ -3214,7 +3654,7 @@
           <a:p>
             <a:fld id="{1E324CB4-F072-414C-8921-E4602240F5B0}" type="datetimeFigureOut">
               <a:rPr lang="en-US" smtClean="0"/>
-              <a:t>12/17/2014</a:t>
+              <a:t>12/18/2014</a:t>
             </a:fld>
             <a:endParaRPr lang="en-US"/>
           </a:p>
@@ -4162,7 +4602,6 @@
               <a:rPr lang="en-US" sz="2400" dirty="0" smtClean="0"/>
               <a:t>+</a:t>
             </a:r>
-            <a:endParaRPr lang="en-US" sz="2400" dirty="0" smtClean="0"/>
           </a:p>
         </p:txBody>
       </p:sp>
@@ -4413,11 +4852,11 @@
             <a:pPr algn="ctr"/>
             <a:r>
               <a:rPr lang="en-US" dirty="0" smtClean="0"/>
-              <a:t>Poisson blendin</a:t>
+              <a:t>Part II: Poisson </a:t>
             </a:r>
             <a:r>
               <a:rPr lang="en-US" dirty="0" smtClean="0"/>
-              <a:t>g</a:t>
+              <a:t>blending</a:t>
             </a:r>
             <a:endParaRPr lang="en-US" dirty="0"/>
           </a:p>
@@ -4426,36 +4865,6 @@
       <p:pic>
         <p:nvPicPr>
           <p:cNvPr id="2" name="Picture 1"/>
-          <p:cNvPicPr>
-            <a:picLocks noChangeAspect="1"/>
-          </p:cNvPicPr>
-          <p:nvPr/>
-        </p:nvPicPr>
-        <p:blipFill>
-          <a:blip r:embed="rId2">
-            <a:extLst>
-              <a:ext uri="{28A0092B-C50C-407E-A947-70E740481C1C}">
-                <a14:useLocalDpi xmlns:a14="http://schemas.microsoft.com/office/drawing/2010/main" val="0"/>
-              </a:ext>
-            </a:extLst>
-          </a:blip>
-          <a:stretch>
-            <a:fillRect/>
-          </a:stretch>
-        </p:blipFill>
-        <p:spPr>
-          <a:xfrm>
-            <a:off x="1895106" y="1504596"/>
-            <a:ext cx="5277587" cy="2372056"/>
-          </a:xfrm>
-          <a:prstGeom prst="rect">
-            <a:avLst/>
-          </a:prstGeom>
-        </p:spPr>
-      </p:pic>
-      <p:pic>
-        <p:nvPicPr>
-          <p:cNvPr id="5" name="Picture 4"/>
           <p:cNvPicPr>
             <a:picLocks noChangeAspect="1"/>
           </p:cNvPicPr>
@@ -4475,14 +4884,74 @@
         </p:blipFill>
         <p:spPr>
           <a:xfrm>
-            <a:off x="1895106" y="4011923"/>
-            <a:ext cx="5277587" cy="2667066"/>
+            <a:off x="1895106" y="1504596"/>
+            <a:ext cx="5277587" cy="2372056"/>
           </a:xfrm>
           <a:prstGeom prst="rect">
             <a:avLst/>
           </a:prstGeom>
         </p:spPr>
       </p:pic>
+      <p:pic>
+        <p:nvPicPr>
+          <p:cNvPr id="5" name="Picture 4"/>
+          <p:cNvPicPr>
+            <a:picLocks noChangeAspect="1"/>
+          </p:cNvPicPr>
+          <p:nvPr/>
+        </p:nvPicPr>
+        <p:blipFill>
+          <a:blip r:embed="rId4">
+            <a:extLst>
+              <a:ext uri="{28A0092B-C50C-407E-A947-70E740481C1C}">
+                <a14:useLocalDpi xmlns:a14="http://schemas.microsoft.com/office/drawing/2010/main" val="0"/>
+              </a:ext>
+            </a:extLst>
+          </a:blip>
+          <a:stretch>
+            <a:fillRect/>
+          </a:stretch>
+        </p:blipFill>
+        <p:spPr>
+          <a:xfrm>
+            <a:off x="1895106" y="4011923"/>
+            <a:ext cx="5277587" cy="2667066"/>
+          </a:xfrm>
+          <a:prstGeom prst="rect">
+            <a:avLst/>
+          </a:prstGeom>
+        </p:spPr>
+      </p:pic>
+      <p:sp>
+        <p:nvSpPr>
+          <p:cNvPr id="6" name="TextBox 5"/>
+          <p:cNvSpPr txBox="1"/>
+          <p:nvPr/>
+        </p:nvSpPr>
+        <p:spPr>
+          <a:xfrm>
+            <a:off x="7194649" y="6404573"/>
+            <a:ext cx="1402874" cy="276999"/>
+          </a:xfrm>
+          <a:prstGeom prst="rect">
+            <a:avLst/>
+          </a:prstGeom>
+          <a:noFill/>
+        </p:spPr>
+        <p:txBody>
+          <a:bodyPr wrap="square" rtlCol="0">
+            <a:spAutoFit/>
+          </a:bodyPr>
+          <a:lstStyle/>
+          <a:p>
+            <a:r>
+              <a:rPr lang="en-US" sz="1200" dirty="0" smtClean="0"/>
+              <a:t>Perez</a:t>
+            </a:r>
+            <a:endParaRPr lang="en-US" sz="1200" dirty="0" smtClean="0"/>
+          </a:p>
+        </p:txBody>
+      </p:sp>
     </p:spTree>
     <p:extLst>
       <p:ext uri="{BB962C8B-B14F-4D97-AF65-F5344CB8AC3E}">
@@ -4520,9 +4989,84 @@
           <a:chExt cx="0" cy="0"/>
         </a:xfrm>
       </p:grpSpPr>
+      <p:sp>
+        <p:nvSpPr>
+          <p:cNvPr id="4" name="TextBox 3"/>
+          <p:cNvSpPr txBox="1"/>
+          <p:nvPr/>
+        </p:nvSpPr>
+        <p:spPr>
+          <a:xfrm>
+            <a:off x="762000" y="1752600"/>
+            <a:ext cx="7993380" cy="461665"/>
+          </a:xfrm>
+          <a:prstGeom prst="rect">
+            <a:avLst/>
+          </a:prstGeom>
+          <a:noFill/>
+        </p:spPr>
+        <p:txBody>
+          <a:bodyPr wrap="square" rtlCol="0">
+            <a:spAutoFit/>
+          </a:bodyPr>
+          <a:lstStyle/>
+          <a:p>
+            <a:pPr marL="342900" indent="-342900">
+              <a:buFont typeface="Arial" panose="020B0604020202020204" pitchFamily="34" charset="0"/>
+              <a:buChar char="•"/>
+            </a:pPr>
+            <a:r>
+              <a:rPr lang="en-US" sz="2400" dirty="0" err="1" smtClean="0"/>
+              <a:t>Pseudocode</a:t>
+            </a:r>
+            <a:r>
+              <a:rPr lang="en-US" sz="2400" dirty="0" smtClean="0"/>
+              <a:t> for </a:t>
+            </a:r>
+            <a:r>
+              <a:rPr lang="en-US" sz="2400" dirty="0" smtClean="0"/>
+              <a:t>blending method.</a:t>
+            </a:r>
+            <a:endParaRPr lang="en-US" sz="2400" dirty="0" smtClean="0"/>
+          </a:p>
+        </p:txBody>
+      </p:sp>
+      <p:sp>
+        <p:nvSpPr>
+          <p:cNvPr id="5" name="Title 2"/>
+          <p:cNvSpPr>
+            <a:spLocks noGrp="1"/>
+          </p:cNvSpPr>
+          <p:nvPr>
+            <p:ph type="title"/>
+          </p:nvPr>
+        </p:nvSpPr>
+        <p:spPr>
+          <a:xfrm>
+            <a:off x="762000" y="457200"/>
+            <a:ext cx="7543800" cy="914400"/>
+          </a:xfrm>
+        </p:spPr>
+        <p:txBody>
+          <a:bodyPr/>
+          <a:lstStyle/>
+          <a:p>
+            <a:pPr algn="ctr"/>
+            <a:r>
+              <a:rPr lang="en-US" dirty="0" smtClean="0"/>
+              <a:t>Part II: Poisson </a:t>
+            </a:r>
+            <a:r>
+              <a:rPr lang="en-US" dirty="0" smtClean="0"/>
+              <a:t>blending</a:t>
+            </a:r>
+            <a:endParaRPr lang="en-US" dirty="0"/>
+          </a:p>
+        </p:txBody>
+      </p:sp>
       <p:pic>
         <p:nvPicPr>
-          <p:cNvPr id="2" name="Picture 1"/>
+          <p:cNvPr id="7" name="Picture 6"/>
           <p:cNvPicPr>
             <a:picLocks noChangeAspect="1"/>
           </p:cNvPicPr>
@@ -4542,18 +5086,48 @@
         </p:blipFill>
         <p:spPr>
           <a:xfrm>
-            <a:off x="2362200" y="609600"/>
-            <a:ext cx="4267200" cy="5582168"/>
+            <a:off x="349726" y="2595265"/>
+            <a:ext cx="8368348" cy="2745727"/>
           </a:xfrm>
           <a:prstGeom prst="rect">
             <a:avLst/>
           </a:prstGeom>
         </p:spPr>
       </p:pic>
+      <p:sp>
+        <p:nvSpPr>
+          <p:cNvPr id="8" name="TextBox 7"/>
+          <p:cNvSpPr txBox="1"/>
+          <p:nvPr/>
+        </p:nvSpPr>
+        <p:spPr>
+          <a:xfrm>
+            <a:off x="349726" y="5335069"/>
+            <a:ext cx="7993380" cy="276999"/>
+          </a:xfrm>
+          <a:prstGeom prst="rect">
+            <a:avLst/>
+          </a:prstGeom>
+          <a:noFill/>
+        </p:spPr>
+        <p:txBody>
+          <a:bodyPr wrap="square" rtlCol="0">
+            <a:spAutoFit/>
+          </a:bodyPr>
+          <a:lstStyle/>
+          <a:p>
+            <a:r>
+              <a:rPr lang="en-US" sz="1200" dirty="0"/>
+              <a:t>Evan Wallace</a:t>
+            </a:r>
+            <a:endParaRPr lang="en-US" sz="1200" dirty="0" smtClean="0"/>
+          </a:p>
+        </p:txBody>
+      </p:sp>
     </p:spTree>
     <p:extLst>
       <p:ext uri="{BB962C8B-B14F-4D97-AF65-F5344CB8AC3E}">
-        <p14:creationId xmlns:p14="http://schemas.microsoft.com/office/powerpoint/2010/main" val="1977379917"/>
+        <p14:creationId xmlns:p14="http://schemas.microsoft.com/office/powerpoint/2010/main" val="1175878002"/>
       </p:ext>
     </p:extLst>
   </p:cSld>
@@ -4589,7 +5163,41 @@
       </p:grpSpPr>
       <p:sp>
         <p:nvSpPr>
-          <p:cNvPr id="3" name="Title 2"/>
+          <p:cNvPr id="4" name="TextBox 3"/>
+          <p:cNvSpPr txBox="1"/>
+          <p:nvPr/>
+        </p:nvSpPr>
+        <p:spPr>
+          <a:xfrm>
+            <a:off x="762000" y="1752600"/>
+            <a:ext cx="7993380" cy="461665"/>
+          </a:xfrm>
+          <a:prstGeom prst="rect">
+            <a:avLst/>
+          </a:prstGeom>
+          <a:noFill/>
+        </p:spPr>
+        <p:txBody>
+          <a:bodyPr wrap="square" rtlCol="0">
+            <a:spAutoFit/>
+          </a:bodyPr>
+          <a:lstStyle/>
+          <a:p>
+            <a:pPr marL="342900" indent="-342900">
+              <a:buFont typeface="Arial" panose="020B0604020202020204" pitchFamily="34" charset="0"/>
+              <a:buChar char="•"/>
+            </a:pPr>
+            <a:r>
+              <a:rPr lang="en-US" sz="2400" dirty="0" smtClean="0"/>
+              <a:t>Used Jacobi method to solve sparse linear system.</a:t>
+            </a:r>
+            <a:endParaRPr lang="en-US" sz="2400" dirty="0" smtClean="0"/>
+          </a:p>
+        </p:txBody>
+      </p:sp>
+      <p:sp>
+        <p:nvSpPr>
+          <p:cNvPr id="5" name="Title 2"/>
           <p:cNvSpPr>
             <a:spLocks noGrp="1"/>
           </p:cNvSpPr>
@@ -4610,7 +5218,11 @@
             <a:pPr algn="ctr"/>
             <a:r>
               <a:rPr lang="en-US" dirty="0" smtClean="0"/>
-              <a:t>Results</a:t>
+              <a:t>Part II: Poisson </a:t>
+            </a:r>
+            <a:r>
+              <a:rPr lang="en-US" dirty="0" smtClean="0"/>
+              <a:t>blending</a:t>
             </a:r>
             <a:endParaRPr lang="en-US" dirty="0"/>
           </a:p>
@@ -4618,7 +5230,7 @@
       </p:sp>
       <p:pic>
         <p:nvPicPr>
-          <p:cNvPr id="7" name="Picture 6"/>
+          <p:cNvPr id="2" name="Picture 1"/>
           <p:cNvPicPr>
             <a:picLocks noChangeAspect="1"/>
           </p:cNvPicPr>
@@ -4638,18 +5250,171 @@
         </p:blipFill>
         <p:spPr>
           <a:xfrm>
-            <a:off x="1676400" y="1905000"/>
-            <a:ext cx="5715000" cy="3800475"/>
+            <a:off x="190729" y="3048000"/>
+            <a:ext cx="2719360" cy="3557350"/>
           </a:xfrm>
           <a:prstGeom prst="rect">
             <a:avLst/>
           </a:prstGeom>
         </p:spPr>
       </p:pic>
+      <p:pic>
+        <p:nvPicPr>
+          <p:cNvPr id="3" name="Picture 2"/>
+          <p:cNvPicPr>
+            <a:picLocks noChangeAspect="1"/>
+          </p:cNvPicPr>
+          <p:nvPr/>
+        </p:nvPicPr>
+        <p:blipFill>
+          <a:blip r:embed="rId3">
+            <a:extLst>
+              <a:ext uri="{28A0092B-C50C-407E-A947-70E740481C1C}">
+                <a14:useLocalDpi xmlns:a14="http://schemas.microsoft.com/office/drawing/2010/main" val="0"/>
+              </a:ext>
+            </a:extLst>
+          </a:blip>
+          <a:stretch>
+            <a:fillRect/>
+          </a:stretch>
+        </p:blipFill>
+        <p:spPr>
+          <a:xfrm>
+            <a:off x="3174220" y="3017003"/>
+            <a:ext cx="2719360" cy="3557350"/>
+          </a:xfrm>
+          <a:prstGeom prst="rect">
+            <a:avLst/>
+          </a:prstGeom>
+        </p:spPr>
+      </p:pic>
+      <p:pic>
+        <p:nvPicPr>
+          <p:cNvPr id="6" name="Picture 5"/>
+          <p:cNvPicPr>
+            <a:picLocks noChangeAspect="1"/>
+          </p:cNvPicPr>
+          <p:nvPr/>
+        </p:nvPicPr>
+        <p:blipFill>
+          <a:blip r:embed="rId4">
+            <a:extLst>
+              <a:ext uri="{28A0092B-C50C-407E-A947-70E740481C1C}">
+                <a14:useLocalDpi xmlns:a14="http://schemas.microsoft.com/office/drawing/2010/main" val="0"/>
+              </a:ext>
+            </a:extLst>
+          </a:blip>
+          <a:stretch>
+            <a:fillRect/>
+          </a:stretch>
+        </p:blipFill>
+        <p:spPr>
+          <a:xfrm>
+            <a:off x="6157711" y="3017003"/>
+            <a:ext cx="2719360" cy="3557350"/>
+          </a:xfrm>
+          <a:prstGeom prst="rect">
+            <a:avLst/>
+          </a:prstGeom>
+        </p:spPr>
+      </p:pic>
+      <p:sp>
+        <p:nvSpPr>
+          <p:cNvPr id="7" name="TextBox 6"/>
+          <p:cNvSpPr txBox="1"/>
+          <p:nvPr/>
+        </p:nvSpPr>
+        <p:spPr>
+          <a:xfrm>
+            <a:off x="185563" y="2595265"/>
+            <a:ext cx="2724526" cy="461665"/>
+          </a:xfrm>
+          <a:prstGeom prst="rect">
+            <a:avLst/>
+          </a:prstGeom>
+          <a:noFill/>
+        </p:spPr>
+        <p:txBody>
+          <a:bodyPr wrap="square" rtlCol="0">
+            <a:spAutoFit/>
+          </a:bodyPr>
+          <a:lstStyle/>
+          <a:p>
+            <a:pPr algn="ctr"/>
+            <a:r>
+              <a:rPr lang="en-US" sz="2400" dirty="0" smtClean="0"/>
+              <a:t>1 iteration</a:t>
+            </a:r>
+            <a:endParaRPr lang="en-US" sz="2400" dirty="0" smtClean="0"/>
+          </a:p>
+        </p:txBody>
+      </p:sp>
+      <p:sp>
+        <p:nvSpPr>
+          <p:cNvPr id="8" name="TextBox 7"/>
+          <p:cNvSpPr txBox="1"/>
+          <p:nvPr/>
+        </p:nvSpPr>
+        <p:spPr>
+          <a:xfrm>
+            <a:off x="3171637" y="2555338"/>
+            <a:ext cx="2724526" cy="461665"/>
+          </a:xfrm>
+          <a:prstGeom prst="rect">
+            <a:avLst/>
+          </a:prstGeom>
+          <a:noFill/>
+        </p:spPr>
+        <p:txBody>
+          <a:bodyPr wrap="square" rtlCol="0">
+            <a:spAutoFit/>
+          </a:bodyPr>
+          <a:lstStyle/>
+          <a:p>
+            <a:pPr algn="ctr"/>
+            <a:r>
+              <a:rPr lang="en-US" sz="2400" dirty="0" smtClean="0"/>
+              <a:t>10 iterations</a:t>
+            </a:r>
+            <a:endParaRPr lang="en-US" sz="2400" dirty="0" smtClean="0"/>
+          </a:p>
+        </p:txBody>
+      </p:sp>
+      <p:sp>
+        <p:nvSpPr>
+          <p:cNvPr id="9" name="TextBox 8"/>
+          <p:cNvSpPr txBox="1"/>
+          <p:nvPr/>
+        </p:nvSpPr>
+        <p:spPr>
+          <a:xfrm>
+            <a:off x="6157711" y="2555337"/>
+            <a:ext cx="2724526" cy="461665"/>
+          </a:xfrm>
+          <a:prstGeom prst="rect">
+            <a:avLst/>
+          </a:prstGeom>
+          <a:noFill/>
+        </p:spPr>
+        <p:txBody>
+          <a:bodyPr wrap="square" rtlCol="0">
+            <a:spAutoFit/>
+          </a:bodyPr>
+          <a:lstStyle/>
+          <a:p>
+            <a:pPr algn="ctr"/>
+            <a:r>
+              <a:rPr lang="en-US" sz="2400" dirty="0" smtClean="0"/>
+              <a:t>100 iterations</a:t>
+            </a:r>
+            <a:endParaRPr lang="en-US" sz="2400" dirty="0" smtClean="0"/>
+          </a:p>
+        </p:txBody>
+      </p:sp>
     </p:spTree>
     <p:extLst>
       <p:ext uri="{BB962C8B-B14F-4D97-AF65-F5344CB8AC3E}">
-        <p14:creationId xmlns:p14="http://schemas.microsoft.com/office/powerpoint/2010/main" val="1358696404"/>
+        <p14:creationId xmlns:p14="http://schemas.microsoft.com/office/powerpoint/2010/main" val="391110731"/>
       </p:ext>
     </p:extLst>
   </p:cSld>
@@ -4685,7 +5450,7 @@
       </p:grpSpPr>
       <p:sp>
         <p:nvSpPr>
-          <p:cNvPr id="3" name="Title 2"/>
+          <p:cNvPr id="5" name="Title 2"/>
           <p:cNvSpPr>
             <a:spLocks noGrp="1"/>
           </p:cNvSpPr>
@@ -4706,7 +5471,11 @@
             <a:pPr algn="ctr"/>
             <a:r>
               <a:rPr lang="en-US" dirty="0" smtClean="0"/>
-              <a:t>Results</a:t>
+              <a:t>Part II: Poisson </a:t>
+            </a:r>
+            <a:r>
+              <a:rPr lang="en-US" dirty="0" smtClean="0"/>
+              <a:t>blending</a:t>
             </a:r>
             <a:endParaRPr lang="en-US" dirty="0"/>
           </a:p>
@@ -4714,7 +5483,7 @@
       </p:sp>
       <p:pic>
         <p:nvPicPr>
-          <p:cNvPr id="2" name="Picture 1"/>
+          <p:cNvPr id="6" name="Picture 5"/>
           <p:cNvPicPr>
             <a:picLocks noChangeAspect="1"/>
           </p:cNvPicPr>
@@ -4734,18 +5503,331 @@
         </p:blipFill>
         <p:spPr>
           <a:xfrm>
-            <a:off x="2957512" y="1828800"/>
-            <a:ext cx="3152775" cy="4124325"/>
+            <a:off x="304800" y="4038600"/>
+            <a:ext cx="8458200" cy="2495550"/>
           </a:xfrm>
           <a:prstGeom prst="rect">
             <a:avLst/>
           </a:prstGeom>
         </p:spPr>
       </p:pic>
+      <p:pic>
+        <p:nvPicPr>
+          <p:cNvPr id="7" name="Picture 6"/>
+          <p:cNvPicPr>
+            <a:picLocks noChangeAspect="1"/>
+          </p:cNvPicPr>
+          <p:nvPr/>
+        </p:nvPicPr>
+        <p:blipFill>
+          <a:blip r:embed="rId3">
+            <a:extLst>
+              <a:ext uri="{28A0092B-C50C-407E-A947-70E740481C1C}">
+                <a14:useLocalDpi xmlns:a14="http://schemas.microsoft.com/office/drawing/2010/main" val="0"/>
+              </a:ext>
+            </a:extLst>
+          </a:blip>
+          <a:stretch>
+            <a:fillRect/>
+          </a:stretch>
+        </p:blipFill>
+        <p:spPr>
+          <a:xfrm>
+            <a:off x="307501" y="1905000"/>
+            <a:ext cx="1508171" cy="1972925"/>
+          </a:xfrm>
+          <a:prstGeom prst="rect">
+            <a:avLst/>
+          </a:prstGeom>
+        </p:spPr>
+      </p:pic>
+      <p:pic>
+        <p:nvPicPr>
+          <p:cNvPr id="8" name="Picture 7"/>
+          <p:cNvPicPr>
+            <a:picLocks noChangeAspect="1"/>
+          </p:cNvPicPr>
+          <p:nvPr/>
+        </p:nvPicPr>
+        <p:blipFill>
+          <a:blip r:embed="rId4">
+            <a:extLst>
+              <a:ext uri="{28A0092B-C50C-407E-A947-70E740481C1C}">
+                <a14:useLocalDpi xmlns:a14="http://schemas.microsoft.com/office/drawing/2010/main" val="0"/>
+              </a:ext>
+            </a:extLst>
+          </a:blip>
+          <a:stretch>
+            <a:fillRect/>
+          </a:stretch>
+        </p:blipFill>
+        <p:spPr>
+          <a:xfrm>
+            <a:off x="2021166" y="1898884"/>
+            <a:ext cx="1514747" cy="1981527"/>
+          </a:xfrm>
+          <a:prstGeom prst="rect">
+            <a:avLst/>
+          </a:prstGeom>
+        </p:spPr>
+      </p:pic>
+      <p:pic>
+        <p:nvPicPr>
+          <p:cNvPr id="9" name="Picture 8"/>
+          <p:cNvPicPr>
+            <a:picLocks noChangeAspect="1"/>
+          </p:cNvPicPr>
+          <p:nvPr/>
+        </p:nvPicPr>
+        <p:blipFill>
+          <a:blip r:embed="rId5">
+            <a:extLst>
+              <a:ext uri="{28A0092B-C50C-407E-A947-70E740481C1C}">
+                <a14:useLocalDpi xmlns:a14="http://schemas.microsoft.com/office/drawing/2010/main" val="0"/>
+              </a:ext>
+            </a:extLst>
+          </a:blip>
+          <a:stretch>
+            <a:fillRect/>
+          </a:stretch>
+        </p:blipFill>
+        <p:spPr>
+          <a:xfrm>
+            <a:off x="3745281" y="1898884"/>
+            <a:ext cx="1514747" cy="1981527"/>
+          </a:xfrm>
+          <a:prstGeom prst="rect">
+            <a:avLst/>
+          </a:prstGeom>
+        </p:spPr>
+      </p:pic>
+      <p:pic>
+        <p:nvPicPr>
+          <p:cNvPr id="10" name="Picture 9"/>
+          <p:cNvPicPr>
+            <a:picLocks noChangeAspect="1"/>
+          </p:cNvPicPr>
+          <p:nvPr/>
+        </p:nvPicPr>
+        <p:blipFill>
+          <a:blip r:embed="rId6">
+            <a:extLst>
+              <a:ext uri="{28A0092B-C50C-407E-A947-70E740481C1C}">
+                <a14:useLocalDpi xmlns:a14="http://schemas.microsoft.com/office/drawing/2010/main" val="0"/>
+              </a:ext>
+            </a:extLst>
+          </a:blip>
+          <a:stretch>
+            <a:fillRect/>
+          </a:stretch>
+        </p:blipFill>
+        <p:spPr>
+          <a:xfrm>
+            <a:off x="5469396" y="1900747"/>
+            <a:ext cx="1511898" cy="1977799"/>
+          </a:xfrm>
+          <a:prstGeom prst="rect">
+            <a:avLst/>
+          </a:prstGeom>
+        </p:spPr>
+      </p:pic>
+      <p:pic>
+        <p:nvPicPr>
+          <p:cNvPr id="11" name="Picture 10"/>
+          <p:cNvPicPr>
+            <a:picLocks noChangeAspect="1"/>
+          </p:cNvPicPr>
+          <p:nvPr/>
+        </p:nvPicPr>
+        <p:blipFill>
+          <a:blip r:embed="rId7">
+            <a:extLst>
+              <a:ext uri="{28A0092B-C50C-407E-A947-70E740481C1C}">
+                <a14:useLocalDpi xmlns:a14="http://schemas.microsoft.com/office/drawing/2010/main" val="0"/>
+              </a:ext>
+            </a:extLst>
+          </a:blip>
+          <a:stretch>
+            <a:fillRect/>
+          </a:stretch>
+        </p:blipFill>
+        <p:spPr>
+          <a:xfrm>
+            <a:off x="7190662" y="1881995"/>
+            <a:ext cx="1525756" cy="1995930"/>
+          </a:xfrm>
+          <a:prstGeom prst="rect">
+            <a:avLst/>
+          </a:prstGeom>
+        </p:spPr>
+      </p:pic>
+      <p:sp>
+        <p:nvSpPr>
+          <p:cNvPr id="12" name="TextBox 11"/>
+          <p:cNvSpPr txBox="1"/>
+          <p:nvPr/>
+        </p:nvSpPr>
+        <p:spPr>
+          <a:xfrm>
+            <a:off x="307501" y="1437219"/>
+            <a:ext cx="1510872" cy="461665"/>
+          </a:xfrm>
+          <a:prstGeom prst="rect">
+            <a:avLst/>
+          </a:prstGeom>
+          <a:noFill/>
+        </p:spPr>
+        <p:txBody>
+          <a:bodyPr wrap="square" rtlCol="0">
+            <a:spAutoFit/>
+          </a:bodyPr>
+          <a:lstStyle/>
+          <a:p>
+            <a:pPr algn="ctr"/>
+            <a:r>
+              <a:rPr lang="en-US" sz="2400" dirty="0" smtClean="0"/>
+              <a:t>1000</a:t>
+            </a:r>
+            <a:endParaRPr lang="en-US" sz="2400" dirty="0" smtClean="0"/>
+          </a:p>
+        </p:txBody>
+      </p:sp>
+      <p:sp>
+        <p:nvSpPr>
+          <p:cNvPr id="13" name="TextBox 12"/>
+          <p:cNvSpPr txBox="1"/>
+          <p:nvPr/>
+        </p:nvSpPr>
+        <p:spPr>
+          <a:xfrm>
+            <a:off x="2025041" y="1437218"/>
+            <a:ext cx="1510872" cy="461665"/>
+          </a:xfrm>
+          <a:prstGeom prst="rect">
+            <a:avLst/>
+          </a:prstGeom>
+          <a:noFill/>
+        </p:spPr>
+        <p:txBody>
+          <a:bodyPr wrap="square" rtlCol="0">
+            <a:spAutoFit/>
+          </a:bodyPr>
+          <a:lstStyle/>
+          <a:p>
+            <a:pPr algn="ctr"/>
+            <a:r>
+              <a:rPr lang="en-US" sz="2400" dirty="0" smtClean="0"/>
+              <a:t>2000</a:t>
+            </a:r>
+            <a:endParaRPr lang="en-US" sz="2400" dirty="0" smtClean="0"/>
+          </a:p>
+        </p:txBody>
+      </p:sp>
+      <p:sp>
+        <p:nvSpPr>
+          <p:cNvPr id="14" name="TextBox 13"/>
+          <p:cNvSpPr txBox="1"/>
+          <p:nvPr/>
+        </p:nvSpPr>
+        <p:spPr>
+          <a:xfrm>
+            <a:off x="3738706" y="1437218"/>
+            <a:ext cx="1510872" cy="461665"/>
+          </a:xfrm>
+          <a:prstGeom prst="rect">
+            <a:avLst/>
+          </a:prstGeom>
+          <a:noFill/>
+        </p:spPr>
+        <p:txBody>
+          <a:bodyPr wrap="square" rtlCol="0">
+            <a:spAutoFit/>
+          </a:bodyPr>
+          <a:lstStyle/>
+          <a:p>
+            <a:pPr algn="ctr"/>
+            <a:r>
+              <a:rPr lang="en-US" sz="2400" dirty="0"/>
+              <a:t>3</a:t>
+            </a:r>
+            <a:r>
+              <a:rPr lang="en-US" sz="2400" dirty="0" smtClean="0"/>
+              <a:t>000</a:t>
+            </a:r>
+            <a:endParaRPr lang="en-US" sz="2400" dirty="0" smtClean="0"/>
+          </a:p>
+        </p:txBody>
+      </p:sp>
+      <p:sp>
+        <p:nvSpPr>
+          <p:cNvPr id="15" name="TextBox 14"/>
+          <p:cNvSpPr txBox="1"/>
+          <p:nvPr/>
+        </p:nvSpPr>
+        <p:spPr>
+          <a:xfrm>
+            <a:off x="5452371" y="1437218"/>
+            <a:ext cx="1510872" cy="461665"/>
+          </a:xfrm>
+          <a:prstGeom prst="rect">
+            <a:avLst/>
+          </a:prstGeom>
+          <a:noFill/>
+        </p:spPr>
+        <p:txBody>
+          <a:bodyPr wrap="square" rtlCol="0">
+            <a:spAutoFit/>
+          </a:bodyPr>
+          <a:lstStyle/>
+          <a:p>
+            <a:pPr algn="ctr"/>
+            <a:r>
+              <a:rPr lang="en-US" sz="2400" dirty="0" smtClean="0"/>
+              <a:t>4000</a:t>
+            </a:r>
+            <a:endParaRPr lang="en-US" sz="2400" dirty="0" smtClean="0"/>
+          </a:p>
+        </p:txBody>
+      </p:sp>
+      <p:sp>
+        <p:nvSpPr>
+          <p:cNvPr id="16" name="TextBox 15"/>
+          <p:cNvSpPr txBox="1"/>
+          <p:nvPr/>
+        </p:nvSpPr>
+        <p:spPr>
+          <a:xfrm>
+            <a:off x="7155586" y="1420330"/>
+            <a:ext cx="1510872" cy="461665"/>
+          </a:xfrm>
+          <a:prstGeom prst="rect">
+            <a:avLst/>
+          </a:prstGeom>
+          <a:noFill/>
+        </p:spPr>
+        <p:txBody>
+          <a:bodyPr wrap="square" rtlCol="0">
+            <a:spAutoFit/>
+          </a:bodyPr>
+          <a:lstStyle/>
+          <a:p>
+            <a:pPr algn="ctr"/>
+            <a:r>
+              <a:rPr lang="en-US" sz="2400" dirty="0"/>
+              <a:t>5</a:t>
+            </a:r>
+            <a:r>
+              <a:rPr lang="en-US" sz="2400" dirty="0" smtClean="0"/>
+              <a:t>000</a:t>
+            </a:r>
+            <a:endParaRPr lang="en-US" sz="2400" dirty="0" smtClean="0"/>
+          </a:p>
+        </p:txBody>
+      </p:sp>
     </p:spTree>
     <p:extLst>
       <p:ext uri="{BB962C8B-B14F-4D97-AF65-F5344CB8AC3E}">
-        <p14:creationId xmlns:p14="http://schemas.microsoft.com/office/powerpoint/2010/main" val="168528255"/>
+        <p14:creationId xmlns:p14="http://schemas.microsoft.com/office/powerpoint/2010/main" val="257676839"/>
       </p:ext>
     </p:extLst>
   </p:cSld>
@@ -4810,7 +5892,7 @@
       </p:sp>
       <p:pic>
         <p:nvPicPr>
-          <p:cNvPr id="4" name="Picture 3"/>
+          <p:cNvPr id="7" name="Picture 6"/>
           <p:cNvPicPr>
             <a:picLocks noChangeAspect="1"/>
           </p:cNvPicPr>
@@ -4830,8 +5912,8 @@
         </p:blipFill>
         <p:spPr>
           <a:xfrm>
-            <a:off x="2898569" y="1524000"/>
-            <a:ext cx="3270662" cy="4918769"/>
+            <a:off x="1676400" y="1905000"/>
+            <a:ext cx="5715000" cy="3800475"/>
           </a:xfrm>
           <a:prstGeom prst="rect">
             <a:avLst/>
@@ -4841,7 +5923,7 @@
     </p:spTree>
     <p:extLst>
       <p:ext uri="{BB962C8B-B14F-4D97-AF65-F5344CB8AC3E}">
-        <p14:creationId xmlns:p14="http://schemas.microsoft.com/office/powerpoint/2010/main" val="2343869005"/>
+        <p14:creationId xmlns:p14="http://schemas.microsoft.com/office/powerpoint/2010/main" val="1358696404"/>
       </p:ext>
     </p:extLst>
   </p:cSld>
@@ -5082,8 +6164,38 @@
         </p:blipFill>
         <p:spPr>
           <a:xfrm>
-            <a:off x="3252787" y="2047875"/>
-            <a:ext cx="2638425" cy="2762250"/>
+            <a:off x="1143000" y="1828800"/>
+            <a:ext cx="3152775" cy="4124325"/>
+          </a:xfrm>
+          <a:prstGeom prst="rect">
+            <a:avLst/>
+          </a:prstGeom>
+        </p:spPr>
+      </p:pic>
+      <p:pic>
+        <p:nvPicPr>
+          <p:cNvPr id="4" name="Picture 3"/>
+          <p:cNvPicPr>
+            <a:picLocks noChangeAspect="1"/>
+          </p:cNvPicPr>
+          <p:nvPr/>
+        </p:nvPicPr>
+        <p:blipFill>
+          <a:blip r:embed="rId3">
+            <a:extLst>
+              <a:ext uri="{28A0092B-C50C-407E-A947-70E740481C1C}">
+                <a14:useLocalDpi xmlns:a14="http://schemas.microsoft.com/office/drawing/2010/main" val="0"/>
+              </a:ext>
+            </a:extLst>
+          </a:blip>
+          <a:stretch>
+            <a:fillRect/>
+          </a:stretch>
+        </p:blipFill>
+        <p:spPr>
+          <a:xfrm>
+            <a:off x="4730338" y="1524000"/>
+            <a:ext cx="3270662" cy="4918769"/>
           </a:xfrm>
           <a:prstGeom prst="rect">
             <a:avLst/>
@@ -5093,7 +6205,7 @@
     </p:spTree>
     <p:extLst>
       <p:ext uri="{BB962C8B-B14F-4D97-AF65-F5344CB8AC3E}">
-        <p14:creationId xmlns:p14="http://schemas.microsoft.com/office/powerpoint/2010/main" val="1706206730"/>
+        <p14:creationId xmlns:p14="http://schemas.microsoft.com/office/powerpoint/2010/main" val="3740750830"/>
       </p:ext>
     </p:extLst>
   </p:cSld>
@@ -5274,8 +6386,38 @@
         </p:blipFill>
         <p:spPr>
           <a:xfrm>
-            <a:off x="1219200" y="1524000"/>
-            <a:ext cx="6629400" cy="4972050"/>
+            <a:off x="533400" y="1905000"/>
+            <a:ext cx="5105400" cy="3829050"/>
+          </a:xfrm>
+          <a:prstGeom prst="rect">
+            <a:avLst/>
+          </a:prstGeom>
+        </p:spPr>
+      </p:pic>
+      <p:pic>
+        <p:nvPicPr>
+          <p:cNvPr id="4" name="Picture 3"/>
+          <p:cNvPicPr>
+            <a:picLocks noChangeAspect="1"/>
+          </p:cNvPicPr>
+          <p:nvPr/>
+        </p:nvPicPr>
+        <p:blipFill>
+          <a:blip r:embed="rId3">
+            <a:extLst>
+              <a:ext uri="{28A0092B-C50C-407E-A947-70E740481C1C}">
+                <a14:useLocalDpi xmlns:a14="http://schemas.microsoft.com/office/drawing/2010/main" val="0"/>
+              </a:ext>
+            </a:extLst>
+          </a:blip>
+          <a:stretch>
+            <a:fillRect/>
+          </a:stretch>
+        </p:blipFill>
+        <p:spPr>
+          <a:xfrm>
+            <a:off x="6019800" y="2438400"/>
+            <a:ext cx="2638425" cy="2762250"/>
           </a:xfrm>
           <a:prstGeom prst="rect">
             <a:avLst/>
@@ -6501,4 +7643,265 @@
   <a:objectDefaults/>
   <a:extraClrSchemeLst/>
 </a:theme>
+</file>
+
+<file path=ppt/theme/theme2.xml><?xml version="1.0" encoding="utf-8"?>
+<a:theme xmlns:a="http://schemas.openxmlformats.org/drawingml/2006/main" name="Office Theme">
+  <a:themeElements>
+    <a:clrScheme name="Office">
+      <a:dk1>
+        <a:sysClr val="windowText" lastClr="000000"/>
+      </a:dk1>
+      <a:lt1>
+        <a:sysClr val="window" lastClr="FFFFFF"/>
+      </a:lt1>
+      <a:dk2>
+        <a:srgbClr val="44546A"/>
+      </a:dk2>
+      <a:lt2>
+        <a:srgbClr val="E7E6E6"/>
+      </a:lt2>
+      <a:accent1>
+        <a:srgbClr val="5B9BD5"/>
+      </a:accent1>
+      <a:accent2>
+        <a:srgbClr val="ED7D31"/>
+      </a:accent2>
+      <a:accent3>
+        <a:srgbClr val="A5A5A5"/>
+      </a:accent3>
+      <a:accent4>
+        <a:srgbClr val="FFC000"/>
+      </a:accent4>
+      <a:accent5>
+        <a:srgbClr val="4472C4"/>
+      </a:accent5>
+      <a:accent6>
+        <a:srgbClr val="70AD47"/>
+      </a:accent6>
+      <a:hlink>
+        <a:srgbClr val="0563C1"/>
+      </a:hlink>
+      <a:folHlink>
+        <a:srgbClr val="954F72"/>
+      </a:folHlink>
+    </a:clrScheme>
+    <a:fontScheme name="Office">
+      <a:majorFont>
+        <a:latin typeface="Calibri Light" panose="020F0302020204030204"/>
+        <a:ea typeface=""/>
+        <a:cs typeface=""/>
+        <a:font script="Jpan" typeface="ＭＳ Ｐゴシック"/>
+        <a:font script="Hang" typeface="맑은 고딕"/>
+        <a:font script="Hans" typeface="宋体"/>
+        <a:font script="Hant" typeface="新細明體"/>
+        <a:font script="Arab" typeface="Times New Roman"/>
+        <a:font script="Hebr" typeface="Times New Roman"/>
+        <a:font script="Thai" typeface="Angsana New"/>
+        <a:font script="Ethi" typeface="Nyala"/>
+        <a:font script="Beng" typeface="Vrinda"/>
+        <a:font script="Gujr" typeface="Shruti"/>
+        <a:font script="Khmr" typeface="MoolBoran"/>
+        <a:font script="Knda" typeface="Tunga"/>
+        <a:font script="Guru" typeface="Raavi"/>
+        <a:font script="Cans" typeface="Euphemia"/>
+        <a:font script="Cher" typeface="Plantagenet Cherokee"/>
+        <a:font script="Yiii" typeface="Microsoft Yi Baiti"/>
+        <a:font script="Tibt" typeface="Microsoft Himalaya"/>
+        <a:font script="Thaa" typeface="MV Boli"/>
+        <a:font script="Deva" typeface="Mangal"/>
+        <a:font script="Telu" typeface="Gautami"/>
+        <a:font script="Taml" typeface="Latha"/>
+        <a:font script="Syrc" typeface="Estrangelo Edessa"/>
+        <a:font script="Orya" typeface="Kalinga"/>
+        <a:font script="Mlym" typeface="Kartika"/>
+        <a:font script="Laoo" typeface="DokChampa"/>
+        <a:font script="Sinh" typeface="Iskoola Pota"/>
+        <a:font script="Mong" typeface="Mongolian Baiti"/>
+        <a:font script="Viet" typeface="Times New Roman"/>
+        <a:font script="Uigh" typeface="Microsoft Uighur"/>
+        <a:font script="Geor" typeface="Sylfaen"/>
+      </a:majorFont>
+      <a:minorFont>
+        <a:latin typeface="Calibri" panose="020F0502020204030204"/>
+        <a:ea typeface=""/>
+        <a:cs typeface=""/>
+        <a:font script="Jpan" typeface="ＭＳ Ｐゴシック"/>
+        <a:font script="Hang" typeface="맑은 고딕"/>
+        <a:font script="Hans" typeface="宋体"/>
+        <a:font script="Hant" typeface="新細明體"/>
+        <a:font script="Arab" typeface="Arial"/>
+        <a:font script="Hebr" typeface="Arial"/>
+        <a:font script="Thai" typeface="Cordia New"/>
+        <a:font script="Ethi" typeface="Nyala"/>
+        <a:font script="Beng" typeface="Vrinda"/>
+        <a:font script="Gujr" typeface="Shruti"/>
+        <a:font script="Khmr" typeface="DaunPenh"/>
+        <a:font script="Knda" typeface="Tunga"/>
+        <a:font script="Guru" typeface="Raavi"/>
+        <a:font script="Cans" typeface="Euphemia"/>
+        <a:font script="Cher" typeface="Plantagenet Cherokee"/>
+        <a:font script="Yiii" typeface="Microsoft Yi Baiti"/>
+        <a:font script="Tibt" typeface="Microsoft Himalaya"/>
+        <a:font script="Thaa" typeface="MV Boli"/>
+        <a:font script="Deva" typeface="Mangal"/>
+        <a:font script="Telu" typeface="Gautami"/>
+        <a:font script="Taml" typeface="Latha"/>
+        <a:font script="Syrc" typeface="Estrangelo Edessa"/>
+        <a:font script="Orya" typeface="Kalinga"/>
+        <a:font script="Mlym" typeface="Kartika"/>
+        <a:font script="Laoo" typeface="DokChampa"/>
+        <a:font script="Sinh" typeface="Iskoola Pota"/>
+        <a:font script="Mong" typeface="Mongolian Baiti"/>
+        <a:font script="Viet" typeface="Arial"/>
+        <a:font script="Uigh" typeface="Microsoft Uighur"/>
+        <a:font script="Geor" typeface="Sylfaen"/>
+      </a:minorFont>
+    </a:fontScheme>
+    <a:fmtScheme name="Office">
+      <a:fillStyleLst>
+        <a:solidFill>
+          <a:schemeClr val="phClr"/>
+        </a:solidFill>
+        <a:gradFill rotWithShape="1">
+          <a:gsLst>
+            <a:gs pos="0">
+              <a:schemeClr val="phClr">
+                <a:lumMod val="110000"/>
+                <a:satMod val="105000"/>
+                <a:tint val="67000"/>
+              </a:schemeClr>
+            </a:gs>
+            <a:gs pos="50000">
+              <a:schemeClr val="phClr">
+                <a:lumMod val="105000"/>
+                <a:satMod val="103000"/>
+                <a:tint val="73000"/>
+              </a:schemeClr>
+            </a:gs>
+            <a:gs pos="100000">
+              <a:schemeClr val="phClr">
+                <a:lumMod val="105000"/>
+                <a:satMod val="109000"/>
+                <a:tint val="81000"/>
+              </a:schemeClr>
+            </a:gs>
+          </a:gsLst>
+          <a:lin ang="5400000" scaled="0"/>
+        </a:gradFill>
+        <a:gradFill rotWithShape="1">
+          <a:gsLst>
+            <a:gs pos="0">
+              <a:schemeClr val="phClr">
+                <a:satMod val="103000"/>
+                <a:lumMod val="102000"/>
+                <a:tint val="94000"/>
+              </a:schemeClr>
+            </a:gs>
+            <a:gs pos="50000">
+              <a:schemeClr val="phClr">
+                <a:satMod val="110000"/>
+                <a:lumMod val="100000"/>
+                <a:shade val="100000"/>
+              </a:schemeClr>
+            </a:gs>
+            <a:gs pos="100000">
+              <a:schemeClr val="phClr">
+                <a:lumMod val="99000"/>
+                <a:satMod val="120000"/>
+                <a:shade val="78000"/>
+              </a:schemeClr>
+            </a:gs>
+          </a:gsLst>
+          <a:lin ang="5400000" scaled="0"/>
+        </a:gradFill>
+      </a:fillStyleLst>
+      <a:lnStyleLst>
+        <a:ln w="6350" cap="flat" cmpd="sng" algn="ctr">
+          <a:solidFill>
+            <a:schemeClr val="phClr"/>
+          </a:solidFill>
+          <a:prstDash val="solid"/>
+          <a:miter lim="800000"/>
+        </a:ln>
+        <a:ln w="12700" cap="flat" cmpd="sng" algn="ctr">
+          <a:solidFill>
+            <a:schemeClr val="phClr"/>
+          </a:solidFill>
+          <a:prstDash val="solid"/>
+          <a:miter lim="800000"/>
+        </a:ln>
+        <a:ln w="19050" cap="flat" cmpd="sng" algn="ctr">
+          <a:solidFill>
+            <a:schemeClr val="phClr"/>
+          </a:solidFill>
+          <a:prstDash val="solid"/>
+          <a:miter lim="800000"/>
+        </a:ln>
+      </a:lnStyleLst>
+      <a:effectStyleLst>
+        <a:effectStyle>
+          <a:effectLst/>
+        </a:effectStyle>
+        <a:effectStyle>
+          <a:effectLst/>
+        </a:effectStyle>
+        <a:effectStyle>
+          <a:effectLst>
+            <a:outerShdw blurRad="57150" dist="19050" dir="5400000" algn="ctr" rotWithShape="0">
+              <a:srgbClr val="000000">
+                <a:alpha val="63000"/>
+              </a:srgbClr>
+            </a:outerShdw>
+          </a:effectLst>
+        </a:effectStyle>
+      </a:effectStyleLst>
+      <a:bgFillStyleLst>
+        <a:solidFill>
+          <a:schemeClr val="phClr"/>
+        </a:solidFill>
+        <a:solidFill>
+          <a:schemeClr val="phClr">
+            <a:tint val="95000"/>
+            <a:satMod val="170000"/>
+          </a:schemeClr>
+        </a:solidFill>
+        <a:gradFill rotWithShape="1">
+          <a:gsLst>
+            <a:gs pos="0">
+              <a:schemeClr val="phClr">
+                <a:tint val="93000"/>
+                <a:satMod val="150000"/>
+                <a:shade val="98000"/>
+                <a:lumMod val="102000"/>
+              </a:schemeClr>
+            </a:gs>
+            <a:gs pos="50000">
+              <a:schemeClr val="phClr">
+                <a:tint val="98000"/>
+                <a:satMod val="130000"/>
+                <a:shade val="90000"/>
+                <a:lumMod val="103000"/>
+              </a:schemeClr>
+            </a:gs>
+            <a:gs pos="100000">
+              <a:schemeClr val="phClr">
+                <a:shade val="63000"/>
+                <a:satMod val="120000"/>
+              </a:schemeClr>
+            </a:gs>
+          </a:gsLst>
+          <a:lin ang="5400000" scaled="0"/>
+        </a:gradFill>
+      </a:bgFillStyleLst>
+    </a:fmtScheme>
+  </a:themeElements>
+  <a:objectDefaults/>
+  <a:extraClrSchemeLst/>
+  <a:extLst>
+    <a:ext uri="{05A4C25C-085E-4340-85A3-A5531E510DB2}">
+      <thm15:themeFamily xmlns:thm15="http://schemas.microsoft.com/office/thememl/2012/main" name="Office Theme" id="{62F939B6-93AF-4DB8-9C6B-D6C7DFDC589F}" vid="{4A3C46E8-61CC-4603-A589-7422A47A8E4A}"/>
+    </a:ext>
+  </a:extLst>
+</a:theme>
 </file>
</xml_diff>